<commit_message>
Make Shop UI Example
</commit_message>
<xml_diff>
--- a/UI Design.pptx
+++ b/UI Design.pptx
@@ -6,6 +6,8 @@
   </p:sldMasterIdLst>
   <p:sldIdLst>
     <p:sldId id="256" r:id="rId2"/>
+    <p:sldId id="257" r:id="rId3"/>
+    <p:sldId id="258" r:id="rId4"/>
   </p:sldIdLst>
   <p:sldSz cx="12192000" cy="6858000"/>
   <p:notesSz cx="6858000" cy="9144000"/>
@@ -104,6 +106,11 @@
       </a:defRPr>
     </a:lvl9pPr>
   </p:defaultTextStyle>
+  <p:extLst>
+    <p:ext uri="{EFAFB233-063F-42B5-8137-9DF3F51BA10A}">
+      <p15:sldGuideLst xmlns:p15="http://schemas.microsoft.com/office/powerpoint/2012/main"/>
+    </p:ext>
+  </p:extLst>
 </p:presentation>
 </file>
 
@@ -4598,6 +4605,2670 @@
 </p:sld>
 </file>
 
+<file path=ppt/slides/slide2.xml><?xml version="1.0" encoding="utf-8"?>
+<p:sld xmlns:a="http://schemas.openxmlformats.org/drawingml/2006/main" xmlns:r="http://schemas.openxmlformats.org/officeDocument/2006/relationships" xmlns:p="http://schemas.openxmlformats.org/presentationml/2006/main">
+  <p:cSld>
+    <p:bg>
+      <p:bgPr>
+        <a:blipFill dpi="0" rotWithShape="1">
+          <a:blip r:embed="rId2"/>
+          <a:srcRect/>
+          <a:tile tx="0" ty="0" sx="100000" sy="100000" flip="none" algn="tl"/>
+        </a:blipFill>
+        <a:effectLst/>
+      </p:bgPr>
+    </p:bg>
+    <p:spTree>
+      <p:nvGrpSpPr>
+        <p:cNvPr id="1" name=""/>
+        <p:cNvGrpSpPr/>
+        <p:nvPr/>
+      </p:nvGrpSpPr>
+      <p:grpSpPr>
+        <a:xfrm>
+          <a:off x="0" y="0"/>
+          <a:ext cx="0" cy="0"/>
+          <a:chOff x="0" y="0"/>
+          <a:chExt cx="0" cy="0"/>
+        </a:xfrm>
+      </p:grpSpPr>
+      <p:sp>
+        <p:nvSpPr>
+          <p:cNvPr id="4" name="모서리가 둥근 직사각형 3"/>
+          <p:cNvSpPr/>
+          <p:nvPr/>
+        </p:nvSpPr>
+        <p:spPr>
+          <a:xfrm>
+            <a:off x="812800" y="435429"/>
+            <a:ext cx="4978400" cy="5863771"/>
+          </a:xfrm>
+          <a:prstGeom prst="roundRect">
+            <a:avLst>
+              <a:gd name="adj" fmla="val 6463"/>
+            </a:avLst>
+          </a:prstGeom>
+          <a:solidFill>
+            <a:schemeClr val="accent2">
+              <a:lumMod val="75000"/>
+              <a:alpha val="64000"/>
+            </a:schemeClr>
+          </a:solidFill>
+          <a:ln>
+            <a:noFill/>
+          </a:ln>
+        </p:spPr>
+        <p:style>
+          <a:lnRef idx="2">
+            <a:schemeClr val="accent1">
+              <a:shade val="50000"/>
+            </a:schemeClr>
+          </a:lnRef>
+          <a:fillRef idx="1">
+            <a:schemeClr val="accent1"/>
+          </a:fillRef>
+          <a:effectRef idx="0">
+            <a:schemeClr val="accent1"/>
+          </a:effectRef>
+          <a:fontRef idx="minor">
+            <a:schemeClr val="lt1"/>
+          </a:fontRef>
+        </p:style>
+        <p:txBody>
+          <a:bodyPr rtlCol="0" anchor="ctr"/>
+          <a:lstStyle/>
+          <a:p>
+            <a:pPr algn="ctr"/>
+            <a:endParaRPr lang="ko-KR" altLang="en-US"/>
+          </a:p>
+        </p:txBody>
+      </p:sp>
+      <p:sp>
+        <p:nvSpPr>
+          <p:cNvPr id="6" name="타원 5"/>
+          <p:cNvSpPr/>
+          <p:nvPr/>
+        </p:nvSpPr>
+        <p:spPr>
+          <a:xfrm>
+            <a:off x="2762000" y="798286"/>
+            <a:ext cx="1080000" cy="1080000"/>
+          </a:xfrm>
+          <a:prstGeom prst="ellipse">
+            <a:avLst/>
+          </a:prstGeom>
+          <a:solidFill>
+            <a:srgbClr val="FFC5C5"/>
+          </a:solidFill>
+          <a:ln w="38100" cmpd="sng">
+            <a:solidFill>
+              <a:schemeClr val="tx1"/>
+            </a:solidFill>
+          </a:ln>
+        </p:spPr>
+        <p:style>
+          <a:lnRef idx="2">
+            <a:schemeClr val="accent1">
+              <a:shade val="50000"/>
+            </a:schemeClr>
+          </a:lnRef>
+          <a:fillRef idx="1">
+            <a:schemeClr val="accent1"/>
+          </a:fillRef>
+          <a:effectRef idx="0">
+            <a:schemeClr val="accent1"/>
+          </a:effectRef>
+          <a:fontRef idx="minor">
+            <a:schemeClr val="lt1"/>
+          </a:fontRef>
+        </p:style>
+        <p:txBody>
+          <a:bodyPr rtlCol="0" anchor="ctr"/>
+          <a:lstStyle/>
+          <a:p>
+            <a:pPr algn="ctr"/>
+            <a:endParaRPr lang="ko-KR" altLang="en-US"/>
+          </a:p>
+        </p:txBody>
+      </p:sp>
+      <p:sp>
+        <p:nvSpPr>
+          <p:cNvPr id="7" name="타원 6"/>
+          <p:cNvSpPr/>
+          <p:nvPr/>
+        </p:nvSpPr>
+        <p:spPr>
+          <a:xfrm>
+            <a:off x="4188686" y="798286"/>
+            <a:ext cx="1080000" cy="1080000"/>
+          </a:xfrm>
+          <a:prstGeom prst="ellipse">
+            <a:avLst/>
+          </a:prstGeom>
+          <a:solidFill>
+            <a:srgbClr val="FFC5C5"/>
+          </a:solidFill>
+          <a:ln w="38100" cmpd="sng">
+            <a:solidFill>
+              <a:schemeClr val="tx1"/>
+            </a:solidFill>
+          </a:ln>
+        </p:spPr>
+        <p:style>
+          <a:lnRef idx="2">
+            <a:schemeClr val="accent1">
+              <a:shade val="50000"/>
+            </a:schemeClr>
+          </a:lnRef>
+          <a:fillRef idx="1">
+            <a:schemeClr val="accent1"/>
+          </a:fillRef>
+          <a:effectRef idx="0">
+            <a:schemeClr val="accent1"/>
+          </a:effectRef>
+          <a:fontRef idx="minor">
+            <a:schemeClr val="lt1"/>
+          </a:fontRef>
+        </p:style>
+        <p:txBody>
+          <a:bodyPr rtlCol="0" anchor="ctr"/>
+          <a:lstStyle/>
+          <a:p>
+            <a:pPr algn="ctr"/>
+            <a:endParaRPr lang="ko-KR" altLang="en-US"/>
+          </a:p>
+        </p:txBody>
+      </p:sp>
+      <p:sp>
+        <p:nvSpPr>
+          <p:cNvPr id="8" name="타원 7"/>
+          <p:cNvSpPr/>
+          <p:nvPr/>
+        </p:nvSpPr>
+        <p:spPr>
+          <a:xfrm>
+            <a:off x="1335314" y="2183085"/>
+            <a:ext cx="1080000" cy="1080000"/>
+          </a:xfrm>
+          <a:prstGeom prst="ellipse">
+            <a:avLst/>
+          </a:prstGeom>
+          <a:solidFill>
+            <a:srgbClr val="FFC5C5"/>
+          </a:solidFill>
+          <a:ln w="38100" cmpd="sng">
+            <a:solidFill>
+              <a:schemeClr val="tx1"/>
+            </a:solidFill>
+          </a:ln>
+        </p:spPr>
+        <p:style>
+          <a:lnRef idx="2">
+            <a:schemeClr val="accent1">
+              <a:shade val="50000"/>
+            </a:schemeClr>
+          </a:lnRef>
+          <a:fillRef idx="1">
+            <a:schemeClr val="accent1"/>
+          </a:fillRef>
+          <a:effectRef idx="0">
+            <a:schemeClr val="accent1"/>
+          </a:effectRef>
+          <a:fontRef idx="minor">
+            <a:schemeClr val="lt1"/>
+          </a:fontRef>
+        </p:style>
+        <p:txBody>
+          <a:bodyPr rtlCol="0" anchor="ctr"/>
+          <a:lstStyle/>
+          <a:p>
+            <a:pPr algn="ctr"/>
+            <a:endParaRPr lang="ko-KR" altLang="en-US"/>
+          </a:p>
+        </p:txBody>
+      </p:sp>
+      <p:sp>
+        <p:nvSpPr>
+          <p:cNvPr id="9" name="타원 8"/>
+          <p:cNvSpPr/>
+          <p:nvPr/>
+        </p:nvSpPr>
+        <p:spPr>
+          <a:xfrm>
+            <a:off x="2762000" y="2183085"/>
+            <a:ext cx="1080000" cy="1080000"/>
+          </a:xfrm>
+          <a:prstGeom prst="ellipse">
+            <a:avLst/>
+          </a:prstGeom>
+          <a:solidFill>
+            <a:srgbClr val="FFC5C5"/>
+          </a:solidFill>
+          <a:ln w="38100" cmpd="sng">
+            <a:solidFill>
+              <a:schemeClr val="tx1"/>
+            </a:solidFill>
+          </a:ln>
+        </p:spPr>
+        <p:style>
+          <a:lnRef idx="2">
+            <a:schemeClr val="accent1">
+              <a:shade val="50000"/>
+            </a:schemeClr>
+          </a:lnRef>
+          <a:fillRef idx="1">
+            <a:schemeClr val="accent1"/>
+          </a:fillRef>
+          <a:effectRef idx="0">
+            <a:schemeClr val="accent1"/>
+          </a:effectRef>
+          <a:fontRef idx="minor">
+            <a:schemeClr val="lt1"/>
+          </a:fontRef>
+        </p:style>
+        <p:txBody>
+          <a:bodyPr rtlCol="0" anchor="ctr"/>
+          <a:lstStyle/>
+          <a:p>
+            <a:pPr algn="ctr"/>
+            <a:endParaRPr lang="ko-KR" altLang="en-US"/>
+          </a:p>
+        </p:txBody>
+      </p:sp>
+      <p:sp>
+        <p:nvSpPr>
+          <p:cNvPr id="10" name="타원 9"/>
+          <p:cNvSpPr/>
+          <p:nvPr/>
+        </p:nvSpPr>
+        <p:spPr>
+          <a:xfrm>
+            <a:off x="4188686" y="2183085"/>
+            <a:ext cx="1080000" cy="1080000"/>
+          </a:xfrm>
+          <a:prstGeom prst="ellipse">
+            <a:avLst/>
+          </a:prstGeom>
+          <a:solidFill>
+            <a:srgbClr val="FFC5C5"/>
+          </a:solidFill>
+          <a:ln w="38100" cmpd="sng">
+            <a:solidFill>
+              <a:schemeClr val="tx1"/>
+            </a:solidFill>
+          </a:ln>
+        </p:spPr>
+        <p:style>
+          <a:lnRef idx="2">
+            <a:schemeClr val="accent1">
+              <a:shade val="50000"/>
+            </a:schemeClr>
+          </a:lnRef>
+          <a:fillRef idx="1">
+            <a:schemeClr val="accent1"/>
+          </a:fillRef>
+          <a:effectRef idx="0">
+            <a:schemeClr val="accent1"/>
+          </a:effectRef>
+          <a:fontRef idx="minor">
+            <a:schemeClr val="lt1"/>
+          </a:fontRef>
+        </p:style>
+        <p:txBody>
+          <a:bodyPr rtlCol="0" anchor="ctr"/>
+          <a:lstStyle/>
+          <a:p>
+            <a:pPr algn="ctr"/>
+            <a:endParaRPr lang="ko-KR" altLang="en-US"/>
+          </a:p>
+        </p:txBody>
+      </p:sp>
+      <p:sp>
+        <p:nvSpPr>
+          <p:cNvPr id="11" name="타원 10"/>
+          <p:cNvSpPr/>
+          <p:nvPr/>
+        </p:nvSpPr>
+        <p:spPr>
+          <a:xfrm>
+            <a:off x="1335314" y="4914400"/>
+            <a:ext cx="1080000" cy="1080000"/>
+          </a:xfrm>
+          <a:prstGeom prst="ellipse">
+            <a:avLst/>
+          </a:prstGeom>
+          <a:solidFill>
+            <a:srgbClr val="FFC5C5"/>
+          </a:solidFill>
+          <a:ln w="38100" cmpd="sng">
+            <a:solidFill>
+              <a:schemeClr val="tx1"/>
+            </a:solidFill>
+          </a:ln>
+        </p:spPr>
+        <p:style>
+          <a:lnRef idx="2">
+            <a:schemeClr val="accent1">
+              <a:shade val="50000"/>
+            </a:schemeClr>
+          </a:lnRef>
+          <a:fillRef idx="1">
+            <a:schemeClr val="accent1"/>
+          </a:fillRef>
+          <a:effectRef idx="0">
+            <a:schemeClr val="accent1"/>
+          </a:effectRef>
+          <a:fontRef idx="minor">
+            <a:schemeClr val="lt1"/>
+          </a:fontRef>
+        </p:style>
+        <p:txBody>
+          <a:bodyPr rtlCol="0" anchor="ctr"/>
+          <a:lstStyle/>
+          <a:p>
+            <a:pPr algn="ctr"/>
+            <a:endParaRPr lang="ko-KR" altLang="en-US"/>
+          </a:p>
+        </p:txBody>
+      </p:sp>
+      <p:sp>
+        <p:nvSpPr>
+          <p:cNvPr id="12" name="타원 11"/>
+          <p:cNvSpPr/>
+          <p:nvPr/>
+        </p:nvSpPr>
+        <p:spPr>
+          <a:xfrm>
+            <a:off x="2762000" y="4914400"/>
+            <a:ext cx="1080000" cy="1080000"/>
+          </a:xfrm>
+          <a:prstGeom prst="ellipse">
+            <a:avLst/>
+          </a:prstGeom>
+          <a:solidFill>
+            <a:srgbClr val="FFC5C5"/>
+          </a:solidFill>
+          <a:ln w="38100" cmpd="sng">
+            <a:solidFill>
+              <a:schemeClr val="tx1"/>
+            </a:solidFill>
+          </a:ln>
+        </p:spPr>
+        <p:style>
+          <a:lnRef idx="2">
+            <a:schemeClr val="accent1">
+              <a:shade val="50000"/>
+            </a:schemeClr>
+          </a:lnRef>
+          <a:fillRef idx="1">
+            <a:schemeClr val="accent1"/>
+          </a:fillRef>
+          <a:effectRef idx="0">
+            <a:schemeClr val="accent1"/>
+          </a:effectRef>
+          <a:fontRef idx="minor">
+            <a:schemeClr val="lt1"/>
+          </a:fontRef>
+        </p:style>
+        <p:txBody>
+          <a:bodyPr rtlCol="0" anchor="ctr"/>
+          <a:lstStyle/>
+          <a:p>
+            <a:pPr algn="ctr"/>
+            <a:endParaRPr lang="ko-KR" altLang="en-US"/>
+          </a:p>
+        </p:txBody>
+      </p:sp>
+      <p:sp>
+        <p:nvSpPr>
+          <p:cNvPr id="13" name="타원 12"/>
+          <p:cNvSpPr/>
+          <p:nvPr/>
+        </p:nvSpPr>
+        <p:spPr>
+          <a:xfrm>
+            <a:off x="4188686" y="4914400"/>
+            <a:ext cx="1080000" cy="1080000"/>
+          </a:xfrm>
+          <a:prstGeom prst="ellipse">
+            <a:avLst/>
+          </a:prstGeom>
+          <a:solidFill>
+            <a:srgbClr val="FFC5C5"/>
+          </a:solidFill>
+          <a:ln w="38100" cmpd="sng">
+            <a:solidFill>
+              <a:schemeClr val="tx1"/>
+            </a:solidFill>
+          </a:ln>
+        </p:spPr>
+        <p:style>
+          <a:lnRef idx="2">
+            <a:schemeClr val="accent1">
+              <a:shade val="50000"/>
+            </a:schemeClr>
+          </a:lnRef>
+          <a:fillRef idx="1">
+            <a:schemeClr val="accent1"/>
+          </a:fillRef>
+          <a:effectRef idx="0">
+            <a:schemeClr val="accent1"/>
+          </a:effectRef>
+          <a:fontRef idx="minor">
+            <a:schemeClr val="lt1"/>
+          </a:fontRef>
+        </p:style>
+        <p:txBody>
+          <a:bodyPr rtlCol="0" anchor="ctr"/>
+          <a:lstStyle/>
+          <a:p>
+            <a:pPr algn="ctr"/>
+            <a:endParaRPr lang="ko-KR" altLang="en-US"/>
+          </a:p>
+        </p:txBody>
+      </p:sp>
+      <p:sp>
+        <p:nvSpPr>
+          <p:cNvPr id="14" name="타원 13"/>
+          <p:cNvSpPr/>
+          <p:nvPr/>
+        </p:nvSpPr>
+        <p:spPr>
+          <a:xfrm>
+            <a:off x="1335314" y="3548742"/>
+            <a:ext cx="1080000" cy="1080000"/>
+          </a:xfrm>
+          <a:prstGeom prst="ellipse">
+            <a:avLst/>
+          </a:prstGeom>
+          <a:solidFill>
+            <a:srgbClr val="FFC5C5"/>
+          </a:solidFill>
+          <a:ln w="38100" cmpd="sng">
+            <a:solidFill>
+              <a:schemeClr val="tx1"/>
+            </a:solidFill>
+          </a:ln>
+        </p:spPr>
+        <p:style>
+          <a:lnRef idx="2">
+            <a:schemeClr val="accent1">
+              <a:shade val="50000"/>
+            </a:schemeClr>
+          </a:lnRef>
+          <a:fillRef idx="1">
+            <a:schemeClr val="accent1"/>
+          </a:fillRef>
+          <a:effectRef idx="0">
+            <a:schemeClr val="accent1"/>
+          </a:effectRef>
+          <a:fontRef idx="minor">
+            <a:schemeClr val="lt1"/>
+          </a:fontRef>
+        </p:style>
+        <p:txBody>
+          <a:bodyPr rtlCol="0" anchor="ctr"/>
+          <a:lstStyle/>
+          <a:p>
+            <a:pPr algn="ctr"/>
+            <a:endParaRPr lang="ko-KR" altLang="en-US"/>
+          </a:p>
+        </p:txBody>
+      </p:sp>
+      <p:sp>
+        <p:nvSpPr>
+          <p:cNvPr id="15" name="타원 14"/>
+          <p:cNvSpPr/>
+          <p:nvPr/>
+        </p:nvSpPr>
+        <p:spPr>
+          <a:xfrm>
+            <a:off x="2762000" y="3548742"/>
+            <a:ext cx="1080000" cy="1080000"/>
+          </a:xfrm>
+          <a:prstGeom prst="ellipse">
+            <a:avLst/>
+          </a:prstGeom>
+          <a:solidFill>
+            <a:srgbClr val="FFC5C5"/>
+          </a:solidFill>
+          <a:ln w="38100" cmpd="sng">
+            <a:solidFill>
+              <a:schemeClr val="tx1"/>
+            </a:solidFill>
+          </a:ln>
+        </p:spPr>
+        <p:style>
+          <a:lnRef idx="2">
+            <a:schemeClr val="accent1">
+              <a:shade val="50000"/>
+            </a:schemeClr>
+          </a:lnRef>
+          <a:fillRef idx="1">
+            <a:schemeClr val="accent1"/>
+          </a:fillRef>
+          <a:effectRef idx="0">
+            <a:schemeClr val="accent1"/>
+          </a:effectRef>
+          <a:fontRef idx="minor">
+            <a:schemeClr val="lt1"/>
+          </a:fontRef>
+        </p:style>
+        <p:txBody>
+          <a:bodyPr rtlCol="0" anchor="ctr"/>
+          <a:lstStyle/>
+          <a:p>
+            <a:pPr algn="ctr"/>
+            <a:endParaRPr lang="ko-KR" altLang="en-US"/>
+          </a:p>
+        </p:txBody>
+      </p:sp>
+      <p:sp>
+        <p:nvSpPr>
+          <p:cNvPr id="16" name="타원 15"/>
+          <p:cNvSpPr/>
+          <p:nvPr/>
+        </p:nvSpPr>
+        <p:spPr>
+          <a:xfrm>
+            <a:off x="4188686" y="3548742"/>
+            <a:ext cx="1080000" cy="1080000"/>
+          </a:xfrm>
+          <a:prstGeom prst="ellipse">
+            <a:avLst/>
+          </a:prstGeom>
+          <a:solidFill>
+            <a:srgbClr val="FFC5C5"/>
+          </a:solidFill>
+          <a:ln w="38100" cmpd="sng">
+            <a:solidFill>
+              <a:schemeClr val="tx1"/>
+            </a:solidFill>
+          </a:ln>
+        </p:spPr>
+        <p:style>
+          <a:lnRef idx="2">
+            <a:schemeClr val="accent1">
+              <a:shade val="50000"/>
+            </a:schemeClr>
+          </a:lnRef>
+          <a:fillRef idx="1">
+            <a:schemeClr val="accent1"/>
+          </a:fillRef>
+          <a:effectRef idx="0">
+            <a:schemeClr val="accent1"/>
+          </a:effectRef>
+          <a:fontRef idx="minor">
+            <a:schemeClr val="lt1"/>
+          </a:fontRef>
+        </p:style>
+        <p:txBody>
+          <a:bodyPr rtlCol="0" anchor="ctr"/>
+          <a:lstStyle/>
+          <a:p>
+            <a:pPr algn="ctr"/>
+            <a:endParaRPr lang="ko-KR" altLang="en-US"/>
+          </a:p>
+        </p:txBody>
+      </p:sp>
+      <p:sp>
+        <p:nvSpPr>
+          <p:cNvPr id="18" name="타원 17"/>
+          <p:cNvSpPr/>
+          <p:nvPr/>
+        </p:nvSpPr>
+        <p:spPr>
+          <a:xfrm>
+            <a:off x="2886034" y="966468"/>
+            <a:ext cx="432000" cy="432000"/>
+          </a:xfrm>
+          <a:prstGeom prst="ellipse">
+            <a:avLst/>
+          </a:prstGeom>
+          <a:solidFill>
+            <a:srgbClr val="FFE1E1"/>
+          </a:solidFill>
+          <a:ln>
+            <a:noFill/>
+          </a:ln>
+        </p:spPr>
+        <p:style>
+          <a:lnRef idx="2">
+            <a:schemeClr val="accent1">
+              <a:shade val="50000"/>
+            </a:schemeClr>
+          </a:lnRef>
+          <a:fillRef idx="1">
+            <a:schemeClr val="accent1"/>
+          </a:fillRef>
+          <a:effectRef idx="0">
+            <a:schemeClr val="accent1"/>
+          </a:effectRef>
+          <a:fontRef idx="minor">
+            <a:schemeClr val="lt1"/>
+          </a:fontRef>
+        </p:style>
+        <p:txBody>
+          <a:bodyPr rtlCol="0" anchor="ctr"/>
+          <a:lstStyle/>
+          <a:p>
+            <a:pPr algn="ctr"/>
+            <a:endParaRPr lang="ko-KR" altLang="en-US"/>
+          </a:p>
+        </p:txBody>
+      </p:sp>
+      <p:sp>
+        <p:nvSpPr>
+          <p:cNvPr id="19" name="타원 18"/>
+          <p:cNvSpPr/>
+          <p:nvPr/>
+        </p:nvSpPr>
+        <p:spPr>
+          <a:xfrm>
+            <a:off x="1477604" y="2363774"/>
+            <a:ext cx="432000" cy="432000"/>
+          </a:xfrm>
+          <a:prstGeom prst="ellipse">
+            <a:avLst/>
+          </a:prstGeom>
+          <a:solidFill>
+            <a:srgbClr val="FFE1E1"/>
+          </a:solidFill>
+          <a:ln>
+            <a:noFill/>
+          </a:ln>
+        </p:spPr>
+        <p:style>
+          <a:lnRef idx="2">
+            <a:schemeClr val="accent1">
+              <a:shade val="50000"/>
+            </a:schemeClr>
+          </a:lnRef>
+          <a:fillRef idx="1">
+            <a:schemeClr val="accent1"/>
+          </a:fillRef>
+          <a:effectRef idx="0">
+            <a:schemeClr val="accent1"/>
+          </a:effectRef>
+          <a:fontRef idx="minor">
+            <a:schemeClr val="lt1"/>
+          </a:fontRef>
+        </p:style>
+        <p:txBody>
+          <a:bodyPr rtlCol="0" anchor="ctr"/>
+          <a:lstStyle/>
+          <a:p>
+            <a:pPr algn="ctr"/>
+            <a:endParaRPr lang="ko-KR" altLang="en-US"/>
+          </a:p>
+        </p:txBody>
+      </p:sp>
+      <p:sp>
+        <p:nvSpPr>
+          <p:cNvPr id="20" name="타원 19"/>
+          <p:cNvSpPr/>
+          <p:nvPr/>
+        </p:nvSpPr>
+        <p:spPr>
+          <a:xfrm>
+            <a:off x="2886034" y="2363774"/>
+            <a:ext cx="432000" cy="432000"/>
+          </a:xfrm>
+          <a:prstGeom prst="ellipse">
+            <a:avLst/>
+          </a:prstGeom>
+          <a:solidFill>
+            <a:srgbClr val="FFE1E1"/>
+          </a:solidFill>
+          <a:ln>
+            <a:noFill/>
+          </a:ln>
+        </p:spPr>
+        <p:style>
+          <a:lnRef idx="2">
+            <a:schemeClr val="accent1">
+              <a:shade val="50000"/>
+            </a:schemeClr>
+          </a:lnRef>
+          <a:fillRef idx="1">
+            <a:schemeClr val="accent1"/>
+          </a:fillRef>
+          <a:effectRef idx="0">
+            <a:schemeClr val="accent1"/>
+          </a:effectRef>
+          <a:fontRef idx="minor">
+            <a:schemeClr val="lt1"/>
+          </a:fontRef>
+        </p:style>
+        <p:txBody>
+          <a:bodyPr rtlCol="0" anchor="ctr"/>
+          <a:lstStyle/>
+          <a:p>
+            <a:pPr algn="ctr"/>
+            <a:endParaRPr lang="ko-KR" altLang="en-US"/>
+          </a:p>
+        </p:txBody>
+      </p:sp>
+      <p:sp>
+        <p:nvSpPr>
+          <p:cNvPr id="21" name="타원 20"/>
+          <p:cNvSpPr/>
+          <p:nvPr/>
+        </p:nvSpPr>
+        <p:spPr>
+          <a:xfrm>
+            <a:off x="4296686" y="966468"/>
+            <a:ext cx="432000" cy="432000"/>
+          </a:xfrm>
+          <a:prstGeom prst="ellipse">
+            <a:avLst/>
+          </a:prstGeom>
+          <a:solidFill>
+            <a:srgbClr val="FFE1E1"/>
+          </a:solidFill>
+          <a:ln>
+            <a:noFill/>
+          </a:ln>
+        </p:spPr>
+        <p:style>
+          <a:lnRef idx="2">
+            <a:schemeClr val="accent1">
+              <a:shade val="50000"/>
+            </a:schemeClr>
+          </a:lnRef>
+          <a:fillRef idx="1">
+            <a:schemeClr val="accent1"/>
+          </a:fillRef>
+          <a:effectRef idx="0">
+            <a:schemeClr val="accent1"/>
+          </a:effectRef>
+          <a:fontRef idx="minor">
+            <a:schemeClr val="lt1"/>
+          </a:fontRef>
+        </p:style>
+        <p:txBody>
+          <a:bodyPr rtlCol="0" anchor="ctr"/>
+          <a:lstStyle/>
+          <a:p>
+            <a:pPr algn="ctr"/>
+            <a:endParaRPr lang="ko-KR" altLang="en-US"/>
+          </a:p>
+        </p:txBody>
+      </p:sp>
+      <p:sp>
+        <p:nvSpPr>
+          <p:cNvPr id="22" name="타원 21"/>
+          <p:cNvSpPr/>
+          <p:nvPr/>
+        </p:nvSpPr>
+        <p:spPr>
+          <a:xfrm>
+            <a:off x="4296686" y="2363774"/>
+            <a:ext cx="432000" cy="432000"/>
+          </a:xfrm>
+          <a:prstGeom prst="ellipse">
+            <a:avLst/>
+          </a:prstGeom>
+          <a:solidFill>
+            <a:srgbClr val="FFE1E1"/>
+          </a:solidFill>
+          <a:ln>
+            <a:noFill/>
+          </a:ln>
+        </p:spPr>
+        <p:style>
+          <a:lnRef idx="2">
+            <a:schemeClr val="accent1">
+              <a:shade val="50000"/>
+            </a:schemeClr>
+          </a:lnRef>
+          <a:fillRef idx="1">
+            <a:schemeClr val="accent1"/>
+          </a:fillRef>
+          <a:effectRef idx="0">
+            <a:schemeClr val="accent1"/>
+          </a:effectRef>
+          <a:fontRef idx="minor">
+            <a:schemeClr val="lt1"/>
+          </a:fontRef>
+        </p:style>
+        <p:txBody>
+          <a:bodyPr rtlCol="0" anchor="ctr"/>
+          <a:lstStyle/>
+          <a:p>
+            <a:pPr algn="ctr"/>
+            <a:endParaRPr lang="ko-KR" altLang="en-US"/>
+          </a:p>
+        </p:txBody>
+      </p:sp>
+      <p:sp>
+        <p:nvSpPr>
+          <p:cNvPr id="23" name="타원 22"/>
+          <p:cNvSpPr/>
+          <p:nvPr/>
+        </p:nvSpPr>
+        <p:spPr>
+          <a:xfrm>
+            <a:off x="1477604" y="3707641"/>
+            <a:ext cx="432000" cy="432000"/>
+          </a:xfrm>
+          <a:prstGeom prst="ellipse">
+            <a:avLst/>
+          </a:prstGeom>
+          <a:solidFill>
+            <a:srgbClr val="FFE1E1"/>
+          </a:solidFill>
+          <a:ln>
+            <a:noFill/>
+          </a:ln>
+        </p:spPr>
+        <p:style>
+          <a:lnRef idx="2">
+            <a:schemeClr val="accent1">
+              <a:shade val="50000"/>
+            </a:schemeClr>
+          </a:lnRef>
+          <a:fillRef idx="1">
+            <a:schemeClr val="accent1"/>
+          </a:fillRef>
+          <a:effectRef idx="0">
+            <a:schemeClr val="accent1"/>
+          </a:effectRef>
+          <a:fontRef idx="minor">
+            <a:schemeClr val="lt1"/>
+          </a:fontRef>
+        </p:style>
+        <p:txBody>
+          <a:bodyPr rtlCol="0" anchor="ctr"/>
+          <a:lstStyle/>
+          <a:p>
+            <a:pPr algn="ctr"/>
+            <a:endParaRPr lang="ko-KR" altLang="en-US"/>
+          </a:p>
+        </p:txBody>
+      </p:sp>
+      <p:sp>
+        <p:nvSpPr>
+          <p:cNvPr id="24" name="타원 23"/>
+          <p:cNvSpPr/>
+          <p:nvPr/>
+        </p:nvSpPr>
+        <p:spPr>
+          <a:xfrm>
+            <a:off x="2886034" y="3707641"/>
+            <a:ext cx="432000" cy="432000"/>
+          </a:xfrm>
+          <a:prstGeom prst="ellipse">
+            <a:avLst/>
+          </a:prstGeom>
+          <a:solidFill>
+            <a:srgbClr val="FFE1E1"/>
+          </a:solidFill>
+          <a:ln>
+            <a:noFill/>
+          </a:ln>
+        </p:spPr>
+        <p:style>
+          <a:lnRef idx="2">
+            <a:schemeClr val="accent1">
+              <a:shade val="50000"/>
+            </a:schemeClr>
+          </a:lnRef>
+          <a:fillRef idx="1">
+            <a:schemeClr val="accent1"/>
+          </a:fillRef>
+          <a:effectRef idx="0">
+            <a:schemeClr val="accent1"/>
+          </a:effectRef>
+          <a:fontRef idx="minor">
+            <a:schemeClr val="lt1"/>
+          </a:fontRef>
+        </p:style>
+        <p:txBody>
+          <a:bodyPr rtlCol="0" anchor="ctr"/>
+          <a:lstStyle/>
+          <a:p>
+            <a:pPr algn="ctr"/>
+            <a:endParaRPr lang="ko-KR" altLang="en-US"/>
+          </a:p>
+        </p:txBody>
+      </p:sp>
+      <p:sp>
+        <p:nvSpPr>
+          <p:cNvPr id="25" name="타원 24"/>
+          <p:cNvSpPr/>
+          <p:nvPr/>
+        </p:nvSpPr>
+        <p:spPr>
+          <a:xfrm>
+            <a:off x="1477604" y="5104947"/>
+            <a:ext cx="432000" cy="432000"/>
+          </a:xfrm>
+          <a:prstGeom prst="ellipse">
+            <a:avLst/>
+          </a:prstGeom>
+          <a:solidFill>
+            <a:srgbClr val="FFE1E1"/>
+          </a:solidFill>
+          <a:ln>
+            <a:noFill/>
+          </a:ln>
+        </p:spPr>
+        <p:style>
+          <a:lnRef idx="2">
+            <a:schemeClr val="accent1">
+              <a:shade val="50000"/>
+            </a:schemeClr>
+          </a:lnRef>
+          <a:fillRef idx="1">
+            <a:schemeClr val="accent1"/>
+          </a:fillRef>
+          <a:effectRef idx="0">
+            <a:schemeClr val="accent1"/>
+          </a:effectRef>
+          <a:fontRef idx="minor">
+            <a:schemeClr val="lt1"/>
+          </a:fontRef>
+        </p:style>
+        <p:txBody>
+          <a:bodyPr rtlCol="0" anchor="ctr"/>
+          <a:lstStyle/>
+          <a:p>
+            <a:pPr algn="ctr"/>
+            <a:endParaRPr lang="ko-KR" altLang="en-US"/>
+          </a:p>
+        </p:txBody>
+      </p:sp>
+      <p:sp>
+        <p:nvSpPr>
+          <p:cNvPr id="26" name="타원 25"/>
+          <p:cNvSpPr/>
+          <p:nvPr/>
+        </p:nvSpPr>
+        <p:spPr>
+          <a:xfrm>
+            <a:off x="2886034" y="5104947"/>
+            <a:ext cx="432000" cy="432000"/>
+          </a:xfrm>
+          <a:prstGeom prst="ellipse">
+            <a:avLst/>
+          </a:prstGeom>
+          <a:solidFill>
+            <a:srgbClr val="FFE1E1"/>
+          </a:solidFill>
+          <a:ln>
+            <a:noFill/>
+          </a:ln>
+        </p:spPr>
+        <p:style>
+          <a:lnRef idx="2">
+            <a:schemeClr val="accent1">
+              <a:shade val="50000"/>
+            </a:schemeClr>
+          </a:lnRef>
+          <a:fillRef idx="1">
+            <a:schemeClr val="accent1"/>
+          </a:fillRef>
+          <a:effectRef idx="0">
+            <a:schemeClr val="accent1"/>
+          </a:effectRef>
+          <a:fontRef idx="minor">
+            <a:schemeClr val="lt1"/>
+          </a:fontRef>
+        </p:style>
+        <p:txBody>
+          <a:bodyPr rtlCol="0" anchor="ctr"/>
+          <a:lstStyle/>
+          <a:p>
+            <a:pPr algn="ctr"/>
+            <a:endParaRPr lang="ko-KR" altLang="en-US"/>
+          </a:p>
+        </p:txBody>
+      </p:sp>
+      <p:sp>
+        <p:nvSpPr>
+          <p:cNvPr id="27" name="타원 26"/>
+          <p:cNvSpPr/>
+          <p:nvPr/>
+        </p:nvSpPr>
+        <p:spPr>
+          <a:xfrm>
+            <a:off x="4296686" y="3707641"/>
+            <a:ext cx="432000" cy="432000"/>
+          </a:xfrm>
+          <a:prstGeom prst="ellipse">
+            <a:avLst/>
+          </a:prstGeom>
+          <a:solidFill>
+            <a:srgbClr val="FFE1E1"/>
+          </a:solidFill>
+          <a:ln>
+            <a:noFill/>
+          </a:ln>
+        </p:spPr>
+        <p:style>
+          <a:lnRef idx="2">
+            <a:schemeClr val="accent1">
+              <a:shade val="50000"/>
+            </a:schemeClr>
+          </a:lnRef>
+          <a:fillRef idx="1">
+            <a:schemeClr val="accent1"/>
+          </a:fillRef>
+          <a:effectRef idx="0">
+            <a:schemeClr val="accent1"/>
+          </a:effectRef>
+          <a:fontRef idx="minor">
+            <a:schemeClr val="lt1"/>
+          </a:fontRef>
+        </p:style>
+        <p:txBody>
+          <a:bodyPr rtlCol="0" anchor="ctr"/>
+          <a:lstStyle/>
+          <a:p>
+            <a:pPr algn="ctr"/>
+            <a:endParaRPr lang="ko-KR" altLang="en-US"/>
+          </a:p>
+        </p:txBody>
+      </p:sp>
+      <p:sp>
+        <p:nvSpPr>
+          <p:cNvPr id="28" name="타원 27"/>
+          <p:cNvSpPr/>
+          <p:nvPr/>
+        </p:nvSpPr>
+        <p:spPr>
+          <a:xfrm>
+            <a:off x="4296686" y="5104947"/>
+            <a:ext cx="432000" cy="432000"/>
+          </a:xfrm>
+          <a:prstGeom prst="ellipse">
+            <a:avLst/>
+          </a:prstGeom>
+          <a:solidFill>
+            <a:srgbClr val="FFE1E1"/>
+          </a:solidFill>
+          <a:ln>
+            <a:noFill/>
+          </a:ln>
+        </p:spPr>
+        <p:style>
+          <a:lnRef idx="2">
+            <a:schemeClr val="accent1">
+              <a:shade val="50000"/>
+            </a:schemeClr>
+          </a:lnRef>
+          <a:fillRef idx="1">
+            <a:schemeClr val="accent1"/>
+          </a:fillRef>
+          <a:effectRef idx="0">
+            <a:schemeClr val="accent1"/>
+          </a:effectRef>
+          <a:fontRef idx="minor">
+            <a:schemeClr val="lt1"/>
+          </a:fontRef>
+        </p:style>
+        <p:txBody>
+          <a:bodyPr rtlCol="0" anchor="ctr"/>
+          <a:lstStyle/>
+          <a:p>
+            <a:pPr algn="ctr"/>
+            <a:endParaRPr lang="ko-KR" altLang="en-US"/>
+          </a:p>
+        </p:txBody>
+      </p:sp>
+      <p:sp>
+        <p:nvSpPr>
+          <p:cNvPr id="34" name="타원 33"/>
+          <p:cNvSpPr/>
+          <p:nvPr/>
+        </p:nvSpPr>
+        <p:spPr>
+          <a:xfrm>
+            <a:off x="1281314" y="741404"/>
+            <a:ext cx="1188000" cy="1188000"/>
+          </a:xfrm>
+          <a:prstGeom prst="ellipse">
+            <a:avLst/>
+          </a:prstGeom>
+          <a:solidFill>
+            <a:schemeClr val="bg1"/>
+          </a:solidFill>
+          <a:ln>
+            <a:noFill/>
+          </a:ln>
+        </p:spPr>
+        <p:style>
+          <a:lnRef idx="2">
+            <a:schemeClr val="accent1">
+              <a:shade val="50000"/>
+            </a:schemeClr>
+          </a:lnRef>
+          <a:fillRef idx="1">
+            <a:schemeClr val="accent1"/>
+          </a:fillRef>
+          <a:effectRef idx="0">
+            <a:schemeClr val="accent1"/>
+          </a:effectRef>
+          <a:fontRef idx="minor">
+            <a:schemeClr val="lt1"/>
+          </a:fontRef>
+        </p:style>
+        <p:txBody>
+          <a:bodyPr rtlCol="0" anchor="ctr"/>
+          <a:lstStyle/>
+          <a:p>
+            <a:pPr algn="ctr"/>
+            <a:endParaRPr lang="ko-KR" altLang="en-US"/>
+          </a:p>
+        </p:txBody>
+      </p:sp>
+      <p:grpSp>
+        <p:nvGrpSpPr>
+          <p:cNvPr id="35" name="그룹 34"/>
+          <p:cNvGrpSpPr/>
+          <p:nvPr/>
+        </p:nvGrpSpPr>
+        <p:grpSpPr>
+          <a:xfrm>
+            <a:off x="1335314" y="600635"/>
+            <a:ext cx="1139077" cy="1277651"/>
+            <a:chOff x="1335314" y="600635"/>
+            <a:chExt cx="1139077" cy="1277651"/>
+          </a:xfrm>
+        </p:grpSpPr>
+        <p:sp>
+          <p:nvSpPr>
+            <p:cNvPr id="5" name="타원 4"/>
+            <p:cNvSpPr/>
+            <p:nvPr/>
+          </p:nvSpPr>
+          <p:spPr>
+            <a:xfrm>
+              <a:off x="1335314" y="798286"/>
+              <a:ext cx="1080000" cy="1080000"/>
+            </a:xfrm>
+            <a:prstGeom prst="ellipse">
+              <a:avLst/>
+            </a:prstGeom>
+            <a:solidFill>
+              <a:srgbClr val="FFC5C5"/>
+            </a:solidFill>
+            <a:ln w="38100" cmpd="sng">
+              <a:solidFill>
+                <a:schemeClr val="tx1"/>
+              </a:solidFill>
+            </a:ln>
+          </p:spPr>
+          <p:style>
+            <a:lnRef idx="2">
+              <a:schemeClr val="accent1">
+                <a:shade val="50000"/>
+              </a:schemeClr>
+            </a:lnRef>
+            <a:fillRef idx="1">
+              <a:schemeClr val="accent1"/>
+            </a:fillRef>
+            <a:effectRef idx="0">
+              <a:schemeClr val="accent1"/>
+            </a:effectRef>
+            <a:fontRef idx="minor">
+              <a:schemeClr val="lt1"/>
+            </a:fontRef>
+          </p:style>
+          <p:txBody>
+            <a:bodyPr rtlCol="0" anchor="ctr"/>
+            <a:lstStyle/>
+            <a:p>
+              <a:pPr algn="ctr"/>
+              <a:endParaRPr lang="ko-KR" altLang="en-US"/>
+            </a:p>
+          </p:txBody>
+        </p:sp>
+        <p:sp>
+          <p:nvSpPr>
+            <p:cNvPr id="17" name="타원 16"/>
+            <p:cNvSpPr/>
+            <p:nvPr/>
+          </p:nvSpPr>
+          <p:spPr>
+            <a:xfrm>
+              <a:off x="1477604" y="966468"/>
+              <a:ext cx="432000" cy="432000"/>
+            </a:xfrm>
+            <a:prstGeom prst="ellipse">
+              <a:avLst/>
+            </a:prstGeom>
+            <a:solidFill>
+              <a:srgbClr val="FFE1E1"/>
+            </a:solidFill>
+            <a:ln>
+              <a:noFill/>
+            </a:ln>
+          </p:spPr>
+          <p:style>
+            <a:lnRef idx="2">
+              <a:schemeClr val="accent1">
+                <a:shade val="50000"/>
+              </a:schemeClr>
+            </a:lnRef>
+            <a:fillRef idx="1">
+              <a:schemeClr val="accent1"/>
+            </a:fillRef>
+            <a:effectRef idx="0">
+              <a:schemeClr val="accent1"/>
+            </a:effectRef>
+            <a:fontRef idx="minor">
+              <a:schemeClr val="lt1"/>
+            </a:fontRef>
+          </p:style>
+          <p:txBody>
+            <a:bodyPr rtlCol="0" anchor="ctr"/>
+            <a:lstStyle/>
+            <a:p>
+              <a:pPr algn="ctr"/>
+              <a:endParaRPr lang="ko-KR" altLang="en-US"/>
+            </a:p>
+          </p:txBody>
+        </p:sp>
+        <p:grpSp>
+          <p:nvGrpSpPr>
+            <p:cNvPr id="29" name="그룹 28"/>
+            <p:cNvGrpSpPr/>
+            <p:nvPr/>
+          </p:nvGrpSpPr>
+          <p:grpSpPr>
+            <a:xfrm rot="20302406">
+              <a:off x="1491055" y="1303819"/>
+              <a:ext cx="755887" cy="308337"/>
+              <a:chOff x="1636295" y="1620252"/>
+              <a:chExt cx="7652084" cy="2245895"/>
+            </a:xfrm>
+          </p:grpSpPr>
+          <p:sp>
+            <p:nvSpPr>
+              <p:cNvPr id="30" name="직사각형 29"/>
+              <p:cNvSpPr/>
+              <p:nvPr/>
+            </p:nvSpPr>
+            <p:spPr>
+              <a:xfrm>
+                <a:off x="4764505" y="1620252"/>
+                <a:ext cx="4523874" cy="2245895"/>
+              </a:xfrm>
+              <a:prstGeom prst="rect">
+                <a:avLst/>
+              </a:prstGeom>
+              <a:gradFill>
+                <a:gsLst>
+                  <a:gs pos="0">
+                    <a:schemeClr val="bg1">
+                      <a:lumMod val="50000"/>
+                    </a:schemeClr>
+                  </a:gs>
+                  <a:gs pos="100000">
+                    <a:schemeClr val="bg1">
+                      <a:lumMod val="85000"/>
+                    </a:schemeClr>
+                  </a:gs>
+                </a:gsLst>
+                <a:lin ang="5400000" scaled="1"/>
+              </a:gradFill>
+              <a:ln>
+                <a:noFill/>
+              </a:ln>
+            </p:spPr>
+            <p:style>
+              <a:lnRef idx="2">
+                <a:schemeClr val="accent1">
+                  <a:shade val="50000"/>
+                </a:schemeClr>
+              </a:lnRef>
+              <a:fillRef idx="1">
+                <a:schemeClr val="accent1"/>
+              </a:fillRef>
+              <a:effectRef idx="0">
+                <a:schemeClr val="accent1"/>
+              </a:effectRef>
+              <a:fontRef idx="minor">
+                <a:schemeClr val="lt1"/>
+              </a:fontRef>
+            </p:style>
+            <p:txBody>
+              <a:bodyPr rtlCol="0" anchor="ctr"/>
+              <a:lstStyle/>
+              <a:p>
+                <a:pPr algn="ctr"/>
+                <a:endParaRPr lang="ko-KR" altLang="en-US"/>
+              </a:p>
+            </p:txBody>
+          </p:sp>
+          <p:sp>
+            <p:nvSpPr>
+              <p:cNvPr id="31" name="모서리가 둥근 직사각형 30"/>
+              <p:cNvSpPr/>
+              <p:nvPr/>
+            </p:nvSpPr>
+            <p:spPr>
+              <a:xfrm>
+                <a:off x="1636295" y="1620252"/>
+                <a:ext cx="3256547" cy="978569"/>
+              </a:xfrm>
+              <a:prstGeom prst="roundRect">
+                <a:avLst/>
+              </a:prstGeom>
+              <a:solidFill>
+                <a:schemeClr val="bg2">
+                  <a:lumMod val="25000"/>
+                </a:schemeClr>
+              </a:solidFill>
+              <a:ln>
+                <a:noFill/>
+              </a:ln>
+            </p:spPr>
+            <p:style>
+              <a:lnRef idx="2">
+                <a:schemeClr val="accent1">
+                  <a:shade val="50000"/>
+                </a:schemeClr>
+              </a:lnRef>
+              <a:fillRef idx="1">
+                <a:schemeClr val="accent1"/>
+              </a:fillRef>
+              <a:effectRef idx="0">
+                <a:schemeClr val="accent1"/>
+              </a:effectRef>
+              <a:fontRef idx="minor">
+                <a:schemeClr val="lt1"/>
+              </a:fontRef>
+            </p:style>
+            <p:txBody>
+              <a:bodyPr rtlCol="0" anchor="ctr"/>
+              <a:lstStyle/>
+              <a:p>
+                <a:pPr algn="ctr"/>
+                <a:endParaRPr lang="ko-KR" altLang="en-US"/>
+              </a:p>
+            </p:txBody>
+          </p:sp>
+        </p:grpSp>
+        <p:sp>
+          <p:nvSpPr>
+            <p:cNvPr id="32" name="포인트가 4개인 별 31"/>
+            <p:cNvSpPr/>
+            <p:nvPr/>
+          </p:nvSpPr>
+          <p:spPr>
+            <a:xfrm rot="20693841">
+              <a:off x="1939277" y="976375"/>
+              <a:ext cx="385141" cy="392740"/>
+            </a:xfrm>
+            <a:prstGeom prst="star4">
+              <a:avLst>
+                <a:gd name="adj" fmla="val 11273"/>
+              </a:avLst>
+            </a:prstGeom>
+            <a:gradFill flip="none" rotWithShape="1">
+              <a:gsLst>
+                <a:gs pos="0">
+                  <a:srgbClr val="FFFF93"/>
+                </a:gs>
+                <a:gs pos="76000">
+                  <a:srgbClr val="FFFF00"/>
+                </a:gs>
+              </a:gsLst>
+              <a:path path="circle">
+                <a:fillToRect l="50000" t="50000" r="50000" b="50000"/>
+              </a:path>
+              <a:tileRect/>
+            </a:gradFill>
+            <a:ln>
+              <a:noFill/>
+            </a:ln>
+          </p:spPr>
+          <p:style>
+            <a:lnRef idx="2">
+              <a:schemeClr val="accent1">
+                <a:shade val="50000"/>
+              </a:schemeClr>
+            </a:lnRef>
+            <a:fillRef idx="1">
+              <a:schemeClr val="accent1"/>
+            </a:fillRef>
+            <a:effectRef idx="0">
+              <a:schemeClr val="accent1"/>
+            </a:effectRef>
+            <a:fontRef idx="minor">
+              <a:schemeClr val="lt1"/>
+            </a:fontRef>
+          </p:style>
+          <p:txBody>
+            <a:bodyPr rtlCol="0" anchor="ctr"/>
+            <a:lstStyle/>
+            <a:p>
+              <a:pPr algn="ctr"/>
+              <a:endParaRPr lang="ko-KR" altLang="en-US"/>
+            </a:p>
+          </p:txBody>
+        </p:sp>
+        <p:sp>
+          <p:nvSpPr>
+            <p:cNvPr id="33" name="TextBox 32"/>
+            <p:cNvSpPr txBox="1"/>
+            <p:nvPr/>
+          </p:nvSpPr>
+          <p:spPr>
+            <a:xfrm>
+              <a:off x="2145779" y="600635"/>
+              <a:ext cx="328612" cy="646331"/>
+            </a:xfrm>
+            <a:prstGeom prst="rect">
+              <a:avLst/>
+            </a:prstGeom>
+            <a:noFill/>
+          </p:spPr>
+          <p:txBody>
+            <a:bodyPr wrap="square" rtlCol="0">
+              <a:spAutoFit/>
+            </a:bodyPr>
+            <a:lstStyle/>
+            <a:p>
+              <a:pPr algn="ctr"/>
+              <a:r>
+                <a:rPr lang="en-US" altLang="ko-KR" sz="3600" dirty="0" smtClean="0">
+                  <a:ln w="25400">
+                    <a:solidFill>
+                      <a:schemeClr val="tx1"/>
+                    </a:solidFill>
+                  </a:ln>
+                  <a:solidFill>
+                    <a:srgbClr val="FFFF00"/>
+                  </a:solidFill>
+                  <a:latin typeface="Bauhaus 93" panose="04030905020B02020C02" pitchFamily="82" charset="0"/>
+                </a:rPr>
+                <a:t>0</a:t>
+              </a:r>
+              <a:endParaRPr lang="ko-KR" altLang="en-US" sz="3600" dirty="0">
+                <a:ln w="25400">
+                  <a:solidFill>
+                    <a:schemeClr val="tx1"/>
+                  </a:solidFill>
+                </a:ln>
+                <a:solidFill>
+                  <a:srgbClr val="FFFF00"/>
+                </a:solidFill>
+                <a:latin typeface="Bauhaus 93" panose="04030905020B02020C02" pitchFamily="82" charset="0"/>
+              </a:endParaRPr>
+            </a:p>
+          </p:txBody>
+        </p:sp>
+      </p:grpSp>
+      <p:sp>
+        <p:nvSpPr>
+          <p:cNvPr id="36" name="모서리가 둥근 직사각형 35"/>
+          <p:cNvSpPr/>
+          <p:nvPr/>
+        </p:nvSpPr>
+        <p:spPr>
+          <a:xfrm>
+            <a:off x="6013444" y="510090"/>
+            <a:ext cx="3435356" cy="902417"/>
+          </a:xfrm>
+          <a:prstGeom prst="roundRect">
+            <a:avLst>
+              <a:gd name="adj" fmla="val 6463"/>
+            </a:avLst>
+          </a:prstGeom>
+          <a:solidFill>
+            <a:schemeClr val="accent2">
+              <a:lumMod val="75000"/>
+              <a:alpha val="64000"/>
+            </a:schemeClr>
+          </a:solidFill>
+          <a:ln>
+            <a:noFill/>
+          </a:ln>
+        </p:spPr>
+        <p:style>
+          <a:lnRef idx="2">
+            <a:schemeClr val="accent1">
+              <a:shade val="50000"/>
+            </a:schemeClr>
+          </a:lnRef>
+          <a:fillRef idx="1">
+            <a:schemeClr val="accent1"/>
+          </a:fillRef>
+          <a:effectRef idx="0">
+            <a:schemeClr val="accent1"/>
+          </a:effectRef>
+          <a:fontRef idx="minor">
+            <a:schemeClr val="lt1"/>
+          </a:fontRef>
+        </p:style>
+        <p:txBody>
+          <a:bodyPr rtlCol="0" anchor="ctr"/>
+          <a:lstStyle/>
+          <a:p>
+            <a:pPr algn="ctr"/>
+            <a:r>
+              <a:rPr lang="en-US" altLang="ko-KR" sz="4400" b="1" dirty="0" smtClean="0">
+                <a:ln w="25400">
+                  <a:solidFill>
+                    <a:schemeClr val="tx1"/>
+                  </a:solidFill>
+                </a:ln>
+                <a:solidFill>
+                  <a:srgbClr val="FFFF5D"/>
+                </a:solidFill>
+                <a:latin typeface="Arial Black" panose="020B0A04020102020204" pitchFamily="34" charset="0"/>
+              </a:rPr>
+              <a:t>$</a:t>
+            </a:r>
+            <a:r>
+              <a:rPr lang="en-US" altLang="ko-KR" sz="4400" dirty="0" smtClean="0">
+                <a:ln w="25400">
+                  <a:solidFill>
+                    <a:schemeClr val="tx1"/>
+                  </a:solidFill>
+                </a:ln>
+                <a:solidFill>
+                  <a:srgbClr val="FFFF5D"/>
+                </a:solidFill>
+                <a:latin typeface="Arial Black" panose="020B0A04020102020204" pitchFamily="34" charset="0"/>
+              </a:rPr>
+              <a:t> 384</a:t>
+            </a:r>
+            <a:endParaRPr lang="ko-KR" altLang="en-US" sz="4400" dirty="0">
+              <a:ln w="25400">
+                <a:solidFill>
+                  <a:schemeClr val="tx1"/>
+                </a:solidFill>
+              </a:ln>
+              <a:solidFill>
+                <a:srgbClr val="FFFF5D"/>
+              </a:solidFill>
+              <a:latin typeface="Arial Black" panose="020B0A04020102020204" pitchFamily="34" charset="0"/>
+            </a:endParaRPr>
+          </a:p>
+        </p:txBody>
+      </p:sp>
+      <p:sp>
+        <p:nvSpPr>
+          <p:cNvPr id="37" name="모서리가 둥근 직사각형 36"/>
+          <p:cNvSpPr/>
+          <p:nvPr/>
+        </p:nvSpPr>
+        <p:spPr>
+          <a:xfrm>
+            <a:off x="6015998" y="1578855"/>
+            <a:ext cx="5566402" cy="4720345"/>
+          </a:xfrm>
+          <a:prstGeom prst="roundRect">
+            <a:avLst>
+              <a:gd name="adj" fmla="val 6463"/>
+            </a:avLst>
+          </a:prstGeom>
+          <a:solidFill>
+            <a:schemeClr val="accent2">
+              <a:lumMod val="75000"/>
+              <a:alpha val="64000"/>
+            </a:schemeClr>
+          </a:solidFill>
+          <a:ln>
+            <a:noFill/>
+          </a:ln>
+        </p:spPr>
+        <p:style>
+          <a:lnRef idx="2">
+            <a:schemeClr val="accent1">
+              <a:shade val="50000"/>
+            </a:schemeClr>
+          </a:lnRef>
+          <a:fillRef idx="1">
+            <a:schemeClr val="accent1"/>
+          </a:fillRef>
+          <a:effectRef idx="0">
+            <a:schemeClr val="accent1"/>
+          </a:effectRef>
+          <a:fontRef idx="minor">
+            <a:schemeClr val="lt1"/>
+          </a:fontRef>
+        </p:style>
+        <p:txBody>
+          <a:bodyPr rtlCol="0" anchor="ctr"/>
+          <a:lstStyle/>
+          <a:p>
+            <a:pPr algn="ctr"/>
+            <a:endParaRPr lang="ko-KR" altLang="en-US"/>
+          </a:p>
+        </p:txBody>
+      </p:sp>
+      <p:sp>
+        <p:nvSpPr>
+          <p:cNvPr id="38" name="TextBox 37"/>
+          <p:cNvSpPr txBox="1"/>
+          <p:nvPr/>
+        </p:nvSpPr>
+        <p:spPr>
+          <a:xfrm>
+            <a:off x="7010504" y="1829142"/>
+            <a:ext cx="3577390" cy="707886"/>
+          </a:xfrm>
+          <a:prstGeom prst="rect">
+            <a:avLst/>
+          </a:prstGeom>
+          <a:noFill/>
+        </p:spPr>
+        <p:txBody>
+          <a:bodyPr wrap="square" rtlCol="0">
+            <a:spAutoFit/>
+          </a:bodyPr>
+          <a:lstStyle/>
+          <a:p>
+            <a:pPr algn="ctr"/>
+            <a:r>
+              <a:rPr lang="ko-KR" altLang="en-US" sz="4000" dirty="0" smtClean="0">
+                <a:ln w="38100">
+                  <a:solidFill>
+                    <a:schemeClr val="tx1"/>
+                  </a:solidFill>
+                </a:ln>
+                <a:solidFill>
+                  <a:srgbClr val="FFFF5D"/>
+                </a:solidFill>
+                <a:latin typeface="휴먼둥근헤드라인" panose="02030504000101010101" pitchFamily="18" charset="-127"/>
+                <a:ea typeface="휴먼둥근헤드라인" panose="02030504000101010101" pitchFamily="18" charset="-127"/>
+              </a:rPr>
+              <a:t>날카로운 칼</a:t>
+            </a:r>
+            <a:endParaRPr lang="ko-KR" altLang="en-US" sz="4000" dirty="0">
+              <a:ln w="38100">
+                <a:solidFill>
+                  <a:schemeClr val="tx1"/>
+                </a:solidFill>
+              </a:ln>
+              <a:solidFill>
+                <a:srgbClr val="FFFF5D"/>
+              </a:solidFill>
+              <a:latin typeface="휴먼둥근헤드라인" panose="02030504000101010101" pitchFamily="18" charset="-127"/>
+              <a:ea typeface="휴먼둥근헤드라인" panose="02030504000101010101" pitchFamily="18" charset="-127"/>
+            </a:endParaRPr>
+          </a:p>
+        </p:txBody>
+      </p:sp>
+      <p:grpSp>
+        <p:nvGrpSpPr>
+          <p:cNvPr id="47" name="그룹 46"/>
+          <p:cNvGrpSpPr>
+            <a:grpSpLocks noChangeAspect="1"/>
+          </p:cNvGrpSpPr>
+          <p:nvPr/>
+        </p:nvGrpSpPr>
+        <p:grpSpPr>
+          <a:xfrm>
+            <a:off x="6313714" y="2648056"/>
+            <a:ext cx="1801372" cy="1801372"/>
+            <a:chOff x="6440965" y="2620726"/>
+            <a:chExt cx="1080000" cy="1080000"/>
+          </a:xfrm>
+        </p:grpSpPr>
+        <p:sp>
+          <p:nvSpPr>
+            <p:cNvPr id="40" name="타원 39"/>
+            <p:cNvSpPr/>
+            <p:nvPr/>
+          </p:nvSpPr>
+          <p:spPr>
+            <a:xfrm>
+              <a:off x="6440965" y="2620726"/>
+              <a:ext cx="1080000" cy="1080000"/>
+            </a:xfrm>
+            <a:prstGeom prst="ellipse">
+              <a:avLst/>
+            </a:prstGeom>
+            <a:solidFill>
+              <a:srgbClr val="B7B7FF"/>
+            </a:solidFill>
+            <a:ln w="38100" cmpd="sng">
+              <a:solidFill>
+                <a:schemeClr val="tx1"/>
+              </a:solidFill>
+            </a:ln>
+          </p:spPr>
+          <p:style>
+            <a:lnRef idx="2">
+              <a:schemeClr val="accent1">
+                <a:shade val="50000"/>
+              </a:schemeClr>
+            </a:lnRef>
+            <a:fillRef idx="1">
+              <a:schemeClr val="accent1"/>
+            </a:fillRef>
+            <a:effectRef idx="0">
+              <a:schemeClr val="accent1"/>
+            </a:effectRef>
+            <a:fontRef idx="minor">
+              <a:schemeClr val="lt1"/>
+            </a:fontRef>
+          </p:style>
+          <p:txBody>
+            <a:bodyPr rtlCol="0" anchor="ctr"/>
+            <a:lstStyle/>
+            <a:p>
+              <a:pPr algn="ctr"/>
+              <a:endParaRPr lang="ko-KR" altLang="en-US"/>
+            </a:p>
+          </p:txBody>
+        </p:sp>
+        <p:grpSp>
+          <p:nvGrpSpPr>
+            <p:cNvPr id="42" name="그룹 41"/>
+            <p:cNvGrpSpPr/>
+            <p:nvPr/>
+          </p:nvGrpSpPr>
+          <p:grpSpPr>
+            <a:xfrm rot="20302406">
+              <a:off x="6596706" y="3126259"/>
+              <a:ext cx="755887" cy="308337"/>
+              <a:chOff x="1636295" y="1620252"/>
+              <a:chExt cx="7652084" cy="2245895"/>
+            </a:xfrm>
+          </p:grpSpPr>
+          <p:sp>
+            <p:nvSpPr>
+              <p:cNvPr id="45" name="직사각형 44"/>
+              <p:cNvSpPr/>
+              <p:nvPr/>
+            </p:nvSpPr>
+            <p:spPr>
+              <a:xfrm>
+                <a:off x="4764505" y="1620252"/>
+                <a:ext cx="4523874" cy="2245895"/>
+              </a:xfrm>
+              <a:prstGeom prst="rect">
+                <a:avLst/>
+              </a:prstGeom>
+              <a:gradFill>
+                <a:gsLst>
+                  <a:gs pos="0">
+                    <a:schemeClr val="bg1">
+                      <a:lumMod val="50000"/>
+                    </a:schemeClr>
+                  </a:gs>
+                  <a:gs pos="100000">
+                    <a:schemeClr val="bg1">
+                      <a:lumMod val="85000"/>
+                    </a:schemeClr>
+                  </a:gs>
+                </a:gsLst>
+                <a:lin ang="5400000" scaled="1"/>
+              </a:gradFill>
+              <a:ln>
+                <a:noFill/>
+              </a:ln>
+            </p:spPr>
+            <p:style>
+              <a:lnRef idx="2">
+                <a:schemeClr val="accent1">
+                  <a:shade val="50000"/>
+                </a:schemeClr>
+              </a:lnRef>
+              <a:fillRef idx="1">
+                <a:schemeClr val="accent1"/>
+              </a:fillRef>
+              <a:effectRef idx="0">
+                <a:schemeClr val="accent1"/>
+              </a:effectRef>
+              <a:fontRef idx="minor">
+                <a:schemeClr val="lt1"/>
+              </a:fontRef>
+            </p:style>
+            <p:txBody>
+              <a:bodyPr rtlCol="0" anchor="ctr"/>
+              <a:lstStyle/>
+              <a:p>
+                <a:pPr algn="ctr"/>
+                <a:endParaRPr lang="ko-KR" altLang="en-US"/>
+              </a:p>
+            </p:txBody>
+          </p:sp>
+          <p:sp>
+            <p:nvSpPr>
+              <p:cNvPr id="46" name="모서리가 둥근 직사각형 45"/>
+              <p:cNvSpPr/>
+              <p:nvPr/>
+            </p:nvSpPr>
+            <p:spPr>
+              <a:xfrm>
+                <a:off x="1636295" y="1620252"/>
+                <a:ext cx="3256547" cy="978569"/>
+              </a:xfrm>
+              <a:prstGeom prst="roundRect">
+                <a:avLst/>
+              </a:prstGeom>
+              <a:solidFill>
+                <a:schemeClr val="bg2">
+                  <a:lumMod val="25000"/>
+                </a:schemeClr>
+              </a:solidFill>
+              <a:ln>
+                <a:noFill/>
+              </a:ln>
+            </p:spPr>
+            <p:style>
+              <a:lnRef idx="2">
+                <a:schemeClr val="accent1">
+                  <a:shade val="50000"/>
+                </a:schemeClr>
+              </a:lnRef>
+              <a:fillRef idx="1">
+                <a:schemeClr val="accent1"/>
+              </a:fillRef>
+              <a:effectRef idx="0">
+                <a:schemeClr val="accent1"/>
+              </a:effectRef>
+              <a:fontRef idx="minor">
+                <a:schemeClr val="lt1"/>
+              </a:fontRef>
+            </p:style>
+            <p:txBody>
+              <a:bodyPr rtlCol="0" anchor="ctr"/>
+              <a:lstStyle/>
+              <a:p>
+                <a:pPr algn="ctr"/>
+                <a:endParaRPr lang="ko-KR" altLang="en-US"/>
+              </a:p>
+            </p:txBody>
+          </p:sp>
+        </p:grpSp>
+        <p:sp>
+          <p:nvSpPr>
+            <p:cNvPr id="43" name="포인트가 4개인 별 42"/>
+            <p:cNvSpPr/>
+            <p:nvPr/>
+          </p:nvSpPr>
+          <p:spPr>
+            <a:xfrm rot="20693841">
+              <a:off x="7044928" y="2798815"/>
+              <a:ext cx="385141" cy="392740"/>
+            </a:xfrm>
+            <a:prstGeom prst="star4">
+              <a:avLst>
+                <a:gd name="adj" fmla="val 11273"/>
+              </a:avLst>
+            </a:prstGeom>
+            <a:gradFill flip="none" rotWithShape="1">
+              <a:gsLst>
+                <a:gs pos="0">
+                  <a:srgbClr val="FFFF93"/>
+                </a:gs>
+                <a:gs pos="76000">
+                  <a:srgbClr val="FFFF00"/>
+                </a:gs>
+              </a:gsLst>
+              <a:path path="circle">
+                <a:fillToRect l="50000" t="50000" r="50000" b="50000"/>
+              </a:path>
+              <a:tileRect/>
+            </a:gradFill>
+            <a:ln>
+              <a:noFill/>
+            </a:ln>
+          </p:spPr>
+          <p:style>
+            <a:lnRef idx="2">
+              <a:schemeClr val="accent1">
+                <a:shade val="50000"/>
+              </a:schemeClr>
+            </a:lnRef>
+            <a:fillRef idx="1">
+              <a:schemeClr val="accent1"/>
+            </a:fillRef>
+            <a:effectRef idx="0">
+              <a:schemeClr val="accent1"/>
+            </a:effectRef>
+            <a:fontRef idx="minor">
+              <a:schemeClr val="lt1"/>
+            </a:fontRef>
+          </p:style>
+          <p:txBody>
+            <a:bodyPr rtlCol="0" anchor="ctr"/>
+            <a:lstStyle/>
+            <a:p>
+              <a:pPr algn="ctr"/>
+              <a:endParaRPr lang="ko-KR" altLang="en-US"/>
+            </a:p>
+          </p:txBody>
+        </p:sp>
+      </p:grpSp>
+      <p:sp>
+        <p:nvSpPr>
+          <p:cNvPr id="48" name="모서리가 둥근 직사각형 47"/>
+          <p:cNvSpPr/>
+          <p:nvPr/>
+        </p:nvSpPr>
+        <p:spPr>
+          <a:xfrm>
+            <a:off x="8439054" y="2853743"/>
+            <a:ext cx="2819378" cy="1380386"/>
+          </a:xfrm>
+          <a:prstGeom prst="roundRect">
+            <a:avLst>
+              <a:gd name="adj" fmla="val 50000"/>
+            </a:avLst>
+          </a:prstGeom>
+          <a:solidFill>
+            <a:srgbClr val="92D050"/>
+          </a:solidFill>
+          <a:ln w="63500">
+            <a:solidFill>
+              <a:schemeClr val="tx1"/>
+            </a:solidFill>
+          </a:ln>
+        </p:spPr>
+        <p:style>
+          <a:lnRef idx="2">
+            <a:schemeClr val="accent1">
+              <a:shade val="50000"/>
+            </a:schemeClr>
+          </a:lnRef>
+          <a:fillRef idx="1">
+            <a:schemeClr val="accent1"/>
+          </a:fillRef>
+          <a:effectRef idx="0">
+            <a:schemeClr val="accent1"/>
+          </a:effectRef>
+          <a:fontRef idx="minor">
+            <a:schemeClr val="lt1"/>
+          </a:fontRef>
+        </p:style>
+        <p:txBody>
+          <a:bodyPr rtlCol="0" anchor="ctr"/>
+          <a:lstStyle/>
+          <a:p>
+            <a:pPr algn="ctr"/>
+            <a:r>
+              <a:rPr lang="en-US" altLang="ko-KR" sz="5400" b="1" dirty="0">
+                <a:ln w="25400">
+                  <a:solidFill>
+                    <a:schemeClr val="tx1"/>
+                  </a:solidFill>
+                </a:ln>
+                <a:solidFill>
+                  <a:srgbClr val="FFFF5D"/>
+                </a:solidFill>
+                <a:latin typeface="Arial Black" panose="020B0A04020102020204" pitchFamily="34" charset="0"/>
+              </a:rPr>
+              <a:t>$</a:t>
+            </a:r>
+            <a:r>
+              <a:rPr lang="en-US" altLang="ko-KR" sz="5400" dirty="0">
+                <a:ln w="25400">
+                  <a:solidFill>
+                    <a:schemeClr val="tx1"/>
+                  </a:solidFill>
+                </a:ln>
+                <a:solidFill>
+                  <a:srgbClr val="FFFF5D"/>
+                </a:solidFill>
+                <a:latin typeface="Arial Black" panose="020B0A04020102020204" pitchFamily="34" charset="0"/>
+              </a:rPr>
+              <a:t> </a:t>
+            </a:r>
+            <a:r>
+              <a:rPr lang="en-US" altLang="ko-KR" sz="5400" dirty="0" smtClean="0">
+                <a:ln w="25400">
+                  <a:solidFill>
+                    <a:schemeClr val="tx1"/>
+                  </a:solidFill>
+                </a:ln>
+                <a:solidFill>
+                  <a:srgbClr val="FFFF5D"/>
+                </a:solidFill>
+                <a:latin typeface="Arial Black" panose="020B0A04020102020204" pitchFamily="34" charset="0"/>
+              </a:rPr>
+              <a:t>500</a:t>
+            </a:r>
+            <a:endParaRPr lang="ko-KR" altLang="en-US" sz="5400" dirty="0">
+              <a:ln w="25400">
+                <a:solidFill>
+                  <a:schemeClr val="tx1"/>
+                </a:solidFill>
+              </a:ln>
+              <a:solidFill>
+                <a:srgbClr val="FFFF5D"/>
+              </a:solidFill>
+              <a:latin typeface="Arial Black" panose="020B0A04020102020204" pitchFamily="34" charset="0"/>
+            </a:endParaRPr>
+          </a:p>
+        </p:txBody>
+      </p:sp>
+      <p:sp>
+        <p:nvSpPr>
+          <p:cNvPr id="50" name="모서리가 둥근 직사각형 49"/>
+          <p:cNvSpPr/>
+          <p:nvPr/>
+        </p:nvSpPr>
+        <p:spPr>
+          <a:xfrm>
+            <a:off x="6543518" y="4650288"/>
+            <a:ext cx="4511362" cy="528224"/>
+          </a:xfrm>
+          <a:prstGeom prst="roundRect">
+            <a:avLst>
+              <a:gd name="adj" fmla="val 50000"/>
+            </a:avLst>
+          </a:prstGeom>
+          <a:solidFill>
+            <a:schemeClr val="accent4">
+              <a:lumMod val="40000"/>
+              <a:lumOff val="60000"/>
+            </a:schemeClr>
+          </a:solidFill>
+          <a:ln w="38100">
+            <a:solidFill>
+              <a:schemeClr val="tx1"/>
+            </a:solidFill>
+          </a:ln>
+        </p:spPr>
+        <p:style>
+          <a:lnRef idx="2">
+            <a:schemeClr val="accent1">
+              <a:shade val="50000"/>
+            </a:schemeClr>
+          </a:lnRef>
+          <a:fillRef idx="1">
+            <a:schemeClr val="accent1"/>
+          </a:fillRef>
+          <a:effectRef idx="0">
+            <a:schemeClr val="accent1"/>
+          </a:effectRef>
+          <a:fontRef idx="minor">
+            <a:schemeClr val="lt1"/>
+          </a:fontRef>
+        </p:style>
+        <p:txBody>
+          <a:bodyPr rtlCol="0" anchor="ctr"/>
+          <a:lstStyle/>
+          <a:p>
+            <a:pPr algn="ctr"/>
+            <a:r>
+              <a:rPr lang="en-US" altLang="ko-KR" sz="2400" dirty="0" smtClean="0">
+                <a:ln w="25400">
+                  <a:solidFill>
+                    <a:schemeClr val="tx1"/>
+                  </a:solidFill>
+                </a:ln>
+                <a:solidFill>
+                  <a:srgbClr val="FFFF5D"/>
+                </a:solidFill>
+                <a:latin typeface="Arial Black" panose="020B0A04020102020204" pitchFamily="34" charset="0"/>
+              </a:rPr>
+              <a:t>1</a:t>
+            </a:r>
+            <a:r>
+              <a:rPr lang="en-US" altLang="ko-KR" dirty="0" smtClean="0">
+                <a:ln w="25400">
+                  <a:solidFill>
+                    <a:schemeClr val="tx1"/>
+                  </a:solidFill>
+                </a:ln>
+                <a:solidFill>
+                  <a:srgbClr val="FFFF5D"/>
+                </a:solidFill>
+                <a:latin typeface="Arial Black" panose="020B0A04020102020204" pitchFamily="34" charset="0"/>
+              </a:rPr>
+              <a:t>         </a:t>
+            </a:r>
+            <a:r>
+              <a:rPr lang="en-US" altLang="ko-KR" sz="2400" dirty="0" smtClean="0">
+                <a:ln w="25400">
+                  <a:solidFill>
+                    <a:schemeClr val="tx1"/>
+                  </a:solidFill>
+                </a:ln>
+                <a:solidFill>
+                  <a:srgbClr val="FFFF5D"/>
+                </a:solidFill>
+                <a:latin typeface="Arial Black" panose="020B0A04020102020204" pitchFamily="34" charset="0"/>
+              </a:rPr>
+              <a:t>2</a:t>
+            </a:r>
+            <a:r>
+              <a:rPr lang="en-US" altLang="ko-KR" dirty="0" smtClean="0">
+                <a:ln w="25400">
+                  <a:solidFill>
+                    <a:schemeClr val="tx1"/>
+                  </a:solidFill>
+                </a:ln>
+                <a:solidFill>
+                  <a:srgbClr val="FFFF5D"/>
+                </a:solidFill>
+                <a:latin typeface="Arial Black" panose="020B0A04020102020204" pitchFamily="34" charset="0"/>
+              </a:rPr>
+              <a:t>         </a:t>
+            </a:r>
+            <a:r>
+              <a:rPr lang="en-US" altLang="ko-KR" sz="2400" dirty="0" smtClean="0">
+                <a:ln w="25400">
+                  <a:solidFill>
+                    <a:schemeClr val="tx1"/>
+                  </a:solidFill>
+                </a:ln>
+                <a:solidFill>
+                  <a:srgbClr val="FFFF5D"/>
+                </a:solidFill>
+                <a:latin typeface="Arial Black" panose="020B0A04020102020204" pitchFamily="34" charset="0"/>
+              </a:rPr>
+              <a:t>3</a:t>
+            </a:r>
+            <a:r>
+              <a:rPr lang="en-US" altLang="ko-KR" dirty="0" smtClean="0">
+                <a:ln w="25400">
+                  <a:solidFill>
+                    <a:schemeClr val="tx1"/>
+                  </a:solidFill>
+                </a:ln>
+                <a:solidFill>
+                  <a:srgbClr val="FFFF5D"/>
+                </a:solidFill>
+                <a:latin typeface="Arial Black" panose="020B0A04020102020204" pitchFamily="34" charset="0"/>
+              </a:rPr>
+              <a:t>         </a:t>
+            </a:r>
+            <a:r>
+              <a:rPr lang="en-US" altLang="ko-KR" sz="2400" dirty="0" smtClean="0">
+                <a:ln w="25400">
+                  <a:solidFill>
+                    <a:schemeClr val="tx1"/>
+                  </a:solidFill>
+                </a:ln>
+                <a:solidFill>
+                  <a:srgbClr val="FFFF5D"/>
+                </a:solidFill>
+                <a:latin typeface="Arial Black" panose="020B0A04020102020204" pitchFamily="34" charset="0"/>
+              </a:rPr>
+              <a:t>4</a:t>
+            </a:r>
+            <a:r>
+              <a:rPr lang="en-US" altLang="ko-KR" dirty="0" smtClean="0">
+                <a:ln w="25400">
+                  <a:solidFill>
+                    <a:schemeClr val="tx1"/>
+                  </a:solidFill>
+                </a:ln>
+                <a:solidFill>
+                  <a:srgbClr val="FFFF5D"/>
+                </a:solidFill>
+                <a:latin typeface="Arial Black" panose="020B0A04020102020204" pitchFamily="34" charset="0"/>
+              </a:rPr>
+              <a:t>         </a:t>
+            </a:r>
+            <a:r>
+              <a:rPr lang="en-US" altLang="ko-KR" sz="2400" dirty="0" smtClean="0">
+                <a:ln w="25400">
+                  <a:solidFill>
+                    <a:schemeClr val="tx1"/>
+                  </a:solidFill>
+                </a:ln>
+                <a:solidFill>
+                  <a:srgbClr val="FFFF5D"/>
+                </a:solidFill>
+                <a:latin typeface="Arial Black" panose="020B0A04020102020204" pitchFamily="34" charset="0"/>
+              </a:rPr>
+              <a:t>5</a:t>
+            </a:r>
+            <a:endParaRPr lang="ko-KR" altLang="en-US" sz="2400" dirty="0">
+              <a:ln w="25400">
+                <a:solidFill>
+                  <a:schemeClr val="tx1"/>
+                </a:solidFill>
+              </a:ln>
+              <a:solidFill>
+                <a:srgbClr val="FFFF5D"/>
+              </a:solidFill>
+              <a:latin typeface="Arial Black" panose="020B0A04020102020204" pitchFamily="34" charset="0"/>
+            </a:endParaRPr>
+          </a:p>
+        </p:txBody>
+      </p:sp>
+      <p:cxnSp>
+        <p:nvCxnSpPr>
+          <p:cNvPr id="52" name="직선 연결선 51"/>
+          <p:cNvCxnSpPr/>
+          <p:nvPr/>
+        </p:nvCxnSpPr>
+        <p:spPr>
+          <a:xfrm flipH="1">
+            <a:off x="7443430" y="4706409"/>
+            <a:ext cx="0" cy="415982"/>
+          </a:xfrm>
+          <a:prstGeom prst="line">
+            <a:avLst/>
+          </a:prstGeom>
+          <a:ln w="25400">
+            <a:solidFill>
+              <a:schemeClr val="tx1"/>
+            </a:solidFill>
+          </a:ln>
+        </p:spPr>
+        <p:style>
+          <a:lnRef idx="1">
+            <a:schemeClr val="accent1"/>
+          </a:lnRef>
+          <a:fillRef idx="0">
+            <a:schemeClr val="accent1"/>
+          </a:fillRef>
+          <a:effectRef idx="0">
+            <a:schemeClr val="accent1"/>
+          </a:effectRef>
+          <a:fontRef idx="minor">
+            <a:schemeClr val="tx1"/>
+          </a:fontRef>
+        </p:style>
+      </p:cxnSp>
+      <p:cxnSp>
+        <p:nvCxnSpPr>
+          <p:cNvPr id="54" name="직선 연결선 53"/>
+          <p:cNvCxnSpPr/>
+          <p:nvPr/>
+        </p:nvCxnSpPr>
+        <p:spPr>
+          <a:xfrm flipH="1">
+            <a:off x="8344003" y="4706409"/>
+            <a:ext cx="0" cy="415982"/>
+          </a:xfrm>
+          <a:prstGeom prst="line">
+            <a:avLst/>
+          </a:prstGeom>
+          <a:ln w="25400">
+            <a:solidFill>
+              <a:schemeClr val="tx1"/>
+            </a:solidFill>
+          </a:ln>
+        </p:spPr>
+        <p:style>
+          <a:lnRef idx="1">
+            <a:schemeClr val="accent1"/>
+          </a:lnRef>
+          <a:fillRef idx="0">
+            <a:schemeClr val="accent1"/>
+          </a:fillRef>
+          <a:effectRef idx="0">
+            <a:schemeClr val="accent1"/>
+          </a:effectRef>
+          <a:fontRef idx="minor">
+            <a:schemeClr val="tx1"/>
+          </a:fontRef>
+        </p:style>
+      </p:cxnSp>
+      <p:cxnSp>
+        <p:nvCxnSpPr>
+          <p:cNvPr id="55" name="직선 연결선 54"/>
+          <p:cNvCxnSpPr/>
+          <p:nvPr/>
+        </p:nvCxnSpPr>
+        <p:spPr>
+          <a:xfrm flipH="1">
+            <a:off x="9259330" y="4706409"/>
+            <a:ext cx="0" cy="415982"/>
+          </a:xfrm>
+          <a:prstGeom prst="line">
+            <a:avLst/>
+          </a:prstGeom>
+          <a:ln w="25400">
+            <a:solidFill>
+              <a:schemeClr val="tx1"/>
+            </a:solidFill>
+          </a:ln>
+        </p:spPr>
+        <p:style>
+          <a:lnRef idx="1">
+            <a:schemeClr val="accent1"/>
+          </a:lnRef>
+          <a:fillRef idx="0">
+            <a:schemeClr val="accent1"/>
+          </a:fillRef>
+          <a:effectRef idx="0">
+            <a:schemeClr val="accent1"/>
+          </a:effectRef>
+          <a:fontRef idx="minor">
+            <a:schemeClr val="tx1"/>
+          </a:fontRef>
+        </p:style>
+      </p:cxnSp>
+      <p:cxnSp>
+        <p:nvCxnSpPr>
+          <p:cNvPr id="56" name="직선 연결선 55"/>
+          <p:cNvCxnSpPr/>
+          <p:nvPr/>
+        </p:nvCxnSpPr>
+        <p:spPr>
+          <a:xfrm flipH="1">
+            <a:off x="10164668" y="4706409"/>
+            <a:ext cx="0" cy="415982"/>
+          </a:xfrm>
+          <a:prstGeom prst="line">
+            <a:avLst/>
+          </a:prstGeom>
+          <a:ln w="25400">
+            <a:solidFill>
+              <a:schemeClr val="tx1"/>
+            </a:solidFill>
+          </a:ln>
+        </p:spPr>
+        <p:style>
+          <a:lnRef idx="1">
+            <a:schemeClr val="accent1"/>
+          </a:lnRef>
+          <a:fillRef idx="0">
+            <a:schemeClr val="accent1"/>
+          </a:fillRef>
+          <a:effectRef idx="0">
+            <a:schemeClr val="accent1"/>
+          </a:effectRef>
+          <a:fontRef idx="minor">
+            <a:schemeClr val="tx1"/>
+          </a:fontRef>
+        </p:style>
+      </p:cxnSp>
+      <p:sp>
+        <p:nvSpPr>
+          <p:cNvPr id="58" name="TextBox 57"/>
+          <p:cNvSpPr txBox="1"/>
+          <p:nvPr/>
+        </p:nvSpPr>
+        <p:spPr>
+          <a:xfrm>
+            <a:off x="6217896" y="5240728"/>
+            <a:ext cx="5120546" cy="461665"/>
+          </a:xfrm>
+          <a:prstGeom prst="rect">
+            <a:avLst/>
+          </a:prstGeom>
+          <a:noFill/>
+        </p:spPr>
+        <p:txBody>
+          <a:bodyPr wrap="square" rtlCol="0">
+            <a:spAutoFit/>
+          </a:bodyPr>
+          <a:lstStyle/>
+          <a:p>
+            <a:pPr algn="ctr"/>
+            <a:r>
+              <a:rPr lang="ko-KR" altLang="en-US" sz="2400" dirty="0" smtClean="0">
+                <a:ln w="38100">
+                  <a:noFill/>
+                </a:ln>
+                <a:latin typeface="휴먼매직체" panose="02030504000101010101" pitchFamily="18" charset="-127"/>
+                <a:ea typeface="휴먼매직체" panose="02030504000101010101" pitchFamily="18" charset="-127"/>
+              </a:rPr>
+              <a:t>칼 움직이는 속도가 느려집니다</a:t>
+            </a:r>
+            <a:r>
+              <a:rPr lang="en-US" altLang="ko-KR" sz="2400" dirty="0" smtClean="0">
+                <a:ln w="38100">
+                  <a:noFill/>
+                </a:ln>
+                <a:latin typeface="휴먼매직체" panose="02030504000101010101" pitchFamily="18" charset="-127"/>
+                <a:ea typeface="휴먼매직체" panose="02030504000101010101" pitchFamily="18" charset="-127"/>
+              </a:rPr>
+              <a:t>.</a:t>
+            </a:r>
+            <a:endParaRPr lang="ko-KR" altLang="en-US" sz="2400" dirty="0">
+              <a:ln w="38100">
+                <a:noFill/>
+              </a:ln>
+              <a:latin typeface="휴먼매직체" panose="02030504000101010101" pitchFamily="18" charset="-127"/>
+              <a:ea typeface="휴먼매직체" panose="02030504000101010101" pitchFamily="18" charset="-127"/>
+            </a:endParaRPr>
+          </a:p>
+        </p:txBody>
+      </p:sp>
+      <p:sp>
+        <p:nvSpPr>
+          <p:cNvPr id="59" name="오른쪽 화살표 58"/>
+          <p:cNvSpPr/>
+          <p:nvPr/>
+        </p:nvSpPr>
+        <p:spPr>
+          <a:xfrm>
+            <a:off x="10297236" y="187657"/>
+            <a:ext cx="1612824" cy="1147747"/>
+          </a:xfrm>
+          <a:prstGeom prst="rightArrow">
+            <a:avLst/>
+          </a:prstGeom>
+          <a:solidFill>
+            <a:srgbClr val="FFFF5D"/>
+          </a:solidFill>
+          <a:ln w="38100" cap="rnd">
+            <a:solidFill>
+              <a:schemeClr val="tx1"/>
+            </a:solidFill>
+            <a:round/>
+          </a:ln>
+        </p:spPr>
+        <p:style>
+          <a:lnRef idx="2">
+            <a:schemeClr val="accent1">
+              <a:shade val="50000"/>
+            </a:schemeClr>
+          </a:lnRef>
+          <a:fillRef idx="1">
+            <a:schemeClr val="accent1"/>
+          </a:fillRef>
+          <a:effectRef idx="0">
+            <a:schemeClr val="accent1"/>
+          </a:effectRef>
+          <a:fontRef idx="minor">
+            <a:schemeClr val="lt1"/>
+          </a:fontRef>
+        </p:style>
+        <p:txBody>
+          <a:bodyPr rtlCol="0" anchor="ctr"/>
+          <a:lstStyle/>
+          <a:p>
+            <a:pPr algn="ctr"/>
+            <a:endParaRPr lang="ko-KR" altLang="en-US"/>
+          </a:p>
+        </p:txBody>
+      </p:sp>
+    </p:spTree>
+    <p:extLst>
+      <p:ext uri="{BB962C8B-B14F-4D97-AF65-F5344CB8AC3E}">
+        <p14:creationId xmlns:p14="http://schemas.microsoft.com/office/powerpoint/2010/main" val="1685886558"/>
+      </p:ext>
+    </p:extLst>
+  </p:cSld>
+  <p:clrMapOvr>
+    <a:masterClrMapping/>
+  </p:clrMapOvr>
+</p:sld>
+</file>
+
+<file path=ppt/slides/slide3.xml><?xml version="1.0" encoding="utf-8"?>
+<p:sld xmlns:a="http://schemas.openxmlformats.org/drawingml/2006/main" xmlns:r="http://schemas.openxmlformats.org/officeDocument/2006/relationships" xmlns:p="http://schemas.openxmlformats.org/presentationml/2006/main">
+  <p:cSld>
+    <p:spTree>
+      <p:nvGrpSpPr>
+        <p:cNvPr id="1" name=""/>
+        <p:cNvGrpSpPr/>
+        <p:nvPr/>
+      </p:nvGrpSpPr>
+      <p:grpSpPr>
+        <a:xfrm>
+          <a:off x="0" y="0"/>
+          <a:ext cx="0" cy="0"/>
+          <a:chOff x="0" y="0"/>
+          <a:chExt cx="0" cy="0"/>
+        </a:xfrm>
+      </p:grpSpPr>
+      <p:grpSp>
+        <p:nvGrpSpPr>
+          <p:cNvPr id="9" name="그룹 8"/>
+          <p:cNvGrpSpPr/>
+          <p:nvPr/>
+        </p:nvGrpSpPr>
+        <p:grpSpPr>
+          <a:xfrm>
+            <a:off x="401053" y="1596952"/>
+            <a:ext cx="11486147" cy="1082080"/>
+            <a:chOff x="401053" y="1596952"/>
+            <a:chExt cx="11486147" cy="1082080"/>
+          </a:xfrm>
+        </p:grpSpPr>
+        <p:sp>
+          <p:nvSpPr>
+            <p:cNvPr id="7" name="모서리가 둥근 직사각형 6"/>
+            <p:cNvSpPr/>
+            <p:nvPr/>
+          </p:nvSpPr>
+          <p:spPr>
+            <a:xfrm>
+              <a:off x="401053" y="2181727"/>
+              <a:ext cx="11486147" cy="497305"/>
+            </a:xfrm>
+            <a:prstGeom prst="roundRect">
+              <a:avLst>
+                <a:gd name="adj" fmla="val 50000"/>
+              </a:avLst>
+            </a:prstGeom>
+            <a:gradFill flip="none" rotWithShape="1">
+              <a:gsLst>
+                <a:gs pos="100000">
+                  <a:srgbClr val="B7B7FF"/>
+                </a:gs>
+                <a:gs pos="17000">
+                  <a:srgbClr val="FF0000"/>
+                </a:gs>
+                <a:gs pos="0">
+                  <a:srgbClr val="FFB7B7"/>
+                </a:gs>
+                <a:gs pos="83000">
+                  <a:srgbClr val="0000FF"/>
+                </a:gs>
+                <a:gs pos="50000">
+                  <a:srgbClr val="00FF00"/>
+                </a:gs>
+              </a:gsLst>
+              <a:lin ang="0" scaled="1"/>
+              <a:tileRect/>
+            </a:gradFill>
+            <a:ln>
+              <a:noFill/>
+            </a:ln>
+          </p:spPr>
+          <p:style>
+            <a:lnRef idx="2">
+              <a:schemeClr val="accent1">
+                <a:shade val="50000"/>
+              </a:schemeClr>
+            </a:lnRef>
+            <a:fillRef idx="1">
+              <a:schemeClr val="accent1"/>
+            </a:fillRef>
+            <a:effectRef idx="0">
+              <a:schemeClr val="accent1"/>
+            </a:effectRef>
+            <a:fontRef idx="minor">
+              <a:schemeClr val="lt1"/>
+            </a:fontRef>
+          </p:style>
+          <p:txBody>
+            <a:bodyPr rtlCol="0" anchor="ctr"/>
+            <a:lstStyle/>
+            <a:p>
+              <a:pPr algn="ctr"/>
+              <a:endParaRPr lang="ko-KR" altLang="en-US"/>
+            </a:p>
+          </p:txBody>
+        </p:sp>
+        <p:sp>
+          <p:nvSpPr>
+            <p:cNvPr id="8" name="TextBox 7"/>
+            <p:cNvSpPr txBox="1"/>
+            <p:nvPr/>
+          </p:nvSpPr>
+          <p:spPr>
+            <a:xfrm>
+              <a:off x="2197768" y="1596952"/>
+              <a:ext cx="8037095" cy="584775"/>
+            </a:xfrm>
+            <a:prstGeom prst="rect">
+              <a:avLst/>
+            </a:prstGeom>
+            <a:noFill/>
+          </p:spPr>
+          <p:txBody>
+            <a:bodyPr wrap="square" rtlCol="0">
+              <a:spAutoFit/>
+            </a:bodyPr>
+            <a:lstStyle/>
+            <a:p>
+              <a:r>
+                <a:rPr lang="ko-KR" altLang="en-US" sz="3200" dirty="0" smtClean="0">
+                  <a:latin typeface="휴먼둥근헤드라인" panose="02030504000101010101" pitchFamily="18" charset="-127"/>
+                  <a:ea typeface="휴먼둥근헤드라인" panose="02030504000101010101" pitchFamily="18" charset="-127"/>
+                </a:rPr>
+                <a:t>대</a:t>
+              </a:r>
+              <a:r>
+                <a:rPr lang="en-US" altLang="ko-KR" sz="3200" dirty="0" smtClean="0">
+                  <a:latin typeface="휴먼둥근헤드라인" panose="02030504000101010101" pitchFamily="18" charset="-127"/>
+                  <a:ea typeface="휴먼둥근헤드라인" panose="02030504000101010101" pitchFamily="18" charset="-127"/>
+                </a:rPr>
+                <a:t>				</a:t>
+              </a:r>
+              <a:r>
+                <a:rPr lang="ko-KR" altLang="en-US" sz="3200" dirty="0" smtClean="0">
+                  <a:latin typeface="휴먼둥근헤드라인" panose="02030504000101010101" pitchFamily="18" charset="-127"/>
+                  <a:ea typeface="휴먼둥근헤드라인" panose="02030504000101010101" pitchFamily="18" charset="-127"/>
+                </a:rPr>
+                <a:t>중</a:t>
+              </a:r>
+              <a:r>
+                <a:rPr lang="en-US" altLang="ko-KR" sz="3200" dirty="0" smtClean="0">
+                  <a:latin typeface="휴먼둥근헤드라인" panose="02030504000101010101" pitchFamily="18" charset="-127"/>
+                  <a:ea typeface="휴먼둥근헤드라인" panose="02030504000101010101" pitchFamily="18" charset="-127"/>
+                </a:rPr>
+                <a:t>				</a:t>
+              </a:r>
+              <a:r>
+                <a:rPr lang="en-US" altLang="ko-KR" dirty="0" smtClean="0">
+                  <a:latin typeface="휴먼둥근헤드라인" panose="02030504000101010101" pitchFamily="18" charset="-127"/>
+                  <a:ea typeface="휴먼둥근헤드라인" panose="02030504000101010101" pitchFamily="18" charset="-127"/>
+                </a:rPr>
+                <a:t> </a:t>
+              </a:r>
+              <a:r>
+                <a:rPr lang="ko-KR" altLang="en-US" sz="3200" dirty="0" smtClean="0">
+                  <a:latin typeface="휴먼둥근헤드라인" panose="02030504000101010101" pitchFamily="18" charset="-127"/>
+                  <a:ea typeface="휴먼둥근헤드라인" panose="02030504000101010101" pitchFamily="18" charset="-127"/>
+                </a:rPr>
+                <a:t>소</a:t>
+              </a:r>
+              <a:endParaRPr lang="ko-KR" altLang="en-US" sz="3200" dirty="0">
+                <a:latin typeface="휴먼둥근헤드라인" panose="02030504000101010101" pitchFamily="18" charset="-127"/>
+                <a:ea typeface="휴먼둥근헤드라인" panose="02030504000101010101" pitchFamily="18" charset="-127"/>
+              </a:endParaRPr>
+            </a:p>
+          </p:txBody>
+        </p:sp>
+      </p:grpSp>
+    </p:spTree>
+    <p:extLst>
+      <p:ext uri="{BB962C8B-B14F-4D97-AF65-F5344CB8AC3E}">
+        <p14:creationId xmlns:p14="http://schemas.microsoft.com/office/powerpoint/2010/main" val="1817054956"/>
+      </p:ext>
+    </p:extLst>
+  </p:cSld>
+  <p:clrMapOvr>
+    <a:masterClrMapping/>
+  </p:clrMapOvr>
+</p:sld>
+</file>
+
 <file path=ppt/theme/theme1.xml><?xml version="1.0" encoding="utf-8"?>
 <a:theme xmlns:a="http://schemas.openxmlformats.org/drawingml/2006/main" name="Office 테마">
   <a:themeElements>

</xml_diff>

<commit_message>
Main Right Image 추가
</commit_message>
<xml_diff>
--- a/UI Design.pptx
+++ b/UI Design.pptx
@@ -13,6 +13,7 @@
     <p:sldId id="261" r:id="rId7"/>
     <p:sldId id="262" r:id="rId8"/>
     <p:sldId id="263" r:id="rId9"/>
+    <p:sldId id="264" r:id="rId10"/>
   </p:sldIdLst>
   <p:sldSz cx="12192000" cy="6858000"/>
   <p:notesSz cx="6858000" cy="9144000"/>
@@ -17569,17 +17570,7 @@
                 <a:latin typeface="휴먼매직체" panose="02030504000101010101" pitchFamily="18" charset="-127"/>
                 <a:ea typeface="휴먼매직체" panose="02030504000101010101" pitchFamily="18" charset="-127"/>
               </a:rPr>
-              <a:t>칼이 움직이는 속도가 </a:t>
-            </a:r>
-            <a:r>
-              <a:rPr lang="ko-KR" altLang="en-US" sz="2400" dirty="0" smtClean="0">
-                <a:ln w="38100">
-                  <a:noFill/>
-                </a:ln>
-                <a:latin typeface="휴먼매직체" panose="02030504000101010101" pitchFamily="18" charset="-127"/>
-                <a:ea typeface="휴먼매직체" panose="02030504000101010101" pitchFamily="18" charset="-127"/>
-              </a:rPr>
-              <a:t>빨라집니다</a:t>
+              <a:t>칼이 움직이는 속도가 빨라집니다</a:t>
             </a:r>
             <a:r>
               <a:rPr lang="en-US" altLang="ko-KR" sz="2400" dirty="0" smtClean="0">
@@ -36038,6 +36029,880 @@
 </p:sld>
 </file>
 
+<file path=ppt/slides/slide9.xml><?xml version="1.0" encoding="utf-8"?>
+<p:sld xmlns:a="http://schemas.openxmlformats.org/drawingml/2006/main" xmlns:r="http://schemas.openxmlformats.org/officeDocument/2006/relationships" xmlns:p="http://schemas.openxmlformats.org/presentationml/2006/main">
+  <p:cSld>
+    <p:bg>
+      <p:bgPr>
+        <a:solidFill>
+          <a:schemeClr val="bg1">
+            <a:lumMod val="75000"/>
+          </a:schemeClr>
+        </a:solidFill>
+        <a:effectLst/>
+      </p:bgPr>
+    </p:bg>
+    <p:spTree>
+      <p:nvGrpSpPr>
+        <p:cNvPr id="1" name=""/>
+        <p:cNvGrpSpPr/>
+        <p:nvPr/>
+      </p:nvGrpSpPr>
+      <p:grpSpPr>
+        <a:xfrm>
+          <a:off x="0" y="0"/>
+          <a:ext cx="0" cy="0"/>
+          <a:chOff x="0" y="0"/>
+          <a:chExt cx="0" cy="0"/>
+        </a:xfrm>
+      </p:grpSpPr>
+      <p:grpSp>
+        <p:nvGrpSpPr>
+          <p:cNvPr id="16" name="그룹 15"/>
+          <p:cNvGrpSpPr/>
+          <p:nvPr/>
+        </p:nvGrpSpPr>
+        <p:grpSpPr>
+          <a:xfrm>
+            <a:off x="2526475" y="1844311"/>
+            <a:ext cx="4954622" cy="1569660"/>
+            <a:chOff x="2526475" y="1844311"/>
+            <a:chExt cx="4954622" cy="1569660"/>
+          </a:xfrm>
+        </p:grpSpPr>
+        <p:grpSp>
+          <p:nvGrpSpPr>
+            <p:cNvPr id="12" name="그룹 11"/>
+            <p:cNvGrpSpPr/>
+            <p:nvPr/>
+          </p:nvGrpSpPr>
+          <p:grpSpPr>
+            <a:xfrm>
+              <a:off x="2526475" y="1844311"/>
+              <a:ext cx="4567643" cy="1569660"/>
+              <a:chOff x="2526475" y="1844311"/>
+              <a:chExt cx="4567643" cy="1569660"/>
+            </a:xfrm>
+          </p:grpSpPr>
+          <p:sp>
+            <p:nvSpPr>
+              <p:cNvPr id="5" name="TextBox 4"/>
+              <p:cNvSpPr txBox="1"/>
+              <p:nvPr/>
+            </p:nvSpPr>
+            <p:spPr>
+              <a:xfrm rot="21000000">
+                <a:off x="2526475" y="1844311"/>
+                <a:ext cx="1061508" cy="1569660"/>
+              </a:xfrm>
+              <a:prstGeom prst="rect">
+                <a:avLst/>
+              </a:prstGeom>
+              <a:noFill/>
+            </p:spPr>
+            <p:txBody>
+              <a:bodyPr wrap="none" rtlCol="0">
+                <a:spAutoFit/>
+              </a:bodyPr>
+              <a:lstStyle/>
+              <a:p>
+                <a:pPr algn="ctr"/>
+                <a:r>
+                  <a:rPr lang="en-US" altLang="ko-KR" sz="9600" spc="-100" dirty="0" smtClean="0">
+                    <a:ln w="38100">
+                      <a:solidFill>
+                        <a:schemeClr val="bg1"/>
+                      </a:solidFill>
+                    </a:ln>
+                    <a:gradFill>
+                      <a:gsLst>
+                        <a:gs pos="50000">
+                          <a:srgbClr val="E4D3F1"/>
+                        </a:gs>
+                        <a:gs pos="26000">
+                          <a:srgbClr val="CB4DCE"/>
+                        </a:gs>
+                        <a:gs pos="74000">
+                          <a:srgbClr val="CB4DCE"/>
+                        </a:gs>
+                      </a:gsLst>
+                      <a:lin ang="5400000" scaled="1"/>
+                    </a:gradFill>
+                    <a:effectLst>
+                      <a:outerShdw dist="63500" dir="2700000" algn="tl" rotWithShape="0">
+                        <a:prstClr val="black">
+                          <a:alpha val="40000"/>
+                        </a:prstClr>
+                      </a:outerShdw>
+                    </a:effectLst>
+                    <a:latin typeface="Arial Black" panose="020B0A04020102020204" pitchFamily="34" charset="0"/>
+                  </a:rPr>
+                  <a:t>P</a:t>
+                </a:r>
+                <a:endParaRPr lang="ko-KR" altLang="en-US" sz="7200" spc="-100" dirty="0">
+                  <a:ln w="38100">
+                    <a:solidFill>
+                      <a:schemeClr val="bg1"/>
+                    </a:solidFill>
+                  </a:ln>
+                  <a:gradFill>
+                    <a:gsLst>
+                      <a:gs pos="50000">
+                        <a:srgbClr val="E4D3F1"/>
+                      </a:gs>
+                      <a:gs pos="26000">
+                        <a:srgbClr val="CB4DCE"/>
+                      </a:gs>
+                      <a:gs pos="74000">
+                        <a:srgbClr val="CB4DCE"/>
+                      </a:gs>
+                    </a:gsLst>
+                    <a:lin ang="5400000" scaled="1"/>
+                  </a:gradFill>
+                  <a:effectLst>
+                    <a:outerShdw dist="63500" dir="2700000" algn="tl" rotWithShape="0">
+                      <a:prstClr val="black">
+                        <a:alpha val="40000"/>
+                      </a:prstClr>
+                    </a:outerShdw>
+                  </a:effectLst>
+                  <a:latin typeface="Arial Black" panose="020B0A04020102020204" pitchFamily="34" charset="0"/>
+                </a:endParaRPr>
+              </a:p>
+            </p:txBody>
+          </p:sp>
+          <p:sp>
+            <p:nvSpPr>
+              <p:cNvPr id="6" name="TextBox 5"/>
+              <p:cNvSpPr txBox="1"/>
+              <p:nvPr/>
+            </p:nvSpPr>
+            <p:spPr>
+              <a:xfrm rot="21240000">
+                <a:off x="3263743" y="2094135"/>
+                <a:ext cx="838691" cy="1200329"/>
+              </a:xfrm>
+              <a:prstGeom prst="rect">
+                <a:avLst/>
+              </a:prstGeom>
+              <a:noFill/>
+            </p:spPr>
+            <p:txBody>
+              <a:bodyPr wrap="none" rtlCol="0">
+                <a:spAutoFit/>
+              </a:bodyPr>
+              <a:lstStyle/>
+              <a:p>
+                <a:pPr algn="ctr"/>
+                <a:r>
+                  <a:rPr lang="en-US" altLang="ko-KR" sz="7200" spc="-100" dirty="0" smtClean="0">
+                    <a:ln w="38100">
+                      <a:solidFill>
+                        <a:schemeClr val="bg1"/>
+                      </a:solidFill>
+                    </a:ln>
+                    <a:gradFill>
+                      <a:gsLst>
+                        <a:gs pos="50000">
+                          <a:srgbClr val="E4D3F1"/>
+                        </a:gs>
+                        <a:gs pos="26000">
+                          <a:srgbClr val="CB4DCE"/>
+                        </a:gs>
+                        <a:gs pos="74000">
+                          <a:srgbClr val="CB4DCE"/>
+                        </a:gs>
+                      </a:gsLst>
+                      <a:lin ang="5400000" scaled="1"/>
+                    </a:gradFill>
+                    <a:effectLst>
+                      <a:outerShdw dist="63500" dir="2700000" algn="tl" rotWithShape="0">
+                        <a:prstClr val="black">
+                          <a:alpha val="40000"/>
+                        </a:prstClr>
+                      </a:outerShdw>
+                    </a:effectLst>
+                    <a:latin typeface="Arial Black" panose="020B0A04020102020204" pitchFamily="34" charset="0"/>
+                  </a:rPr>
+                  <a:t>E</a:t>
+                </a:r>
+                <a:endParaRPr lang="ko-KR" altLang="en-US" sz="7200" spc="-100" dirty="0">
+                  <a:ln w="38100">
+                    <a:solidFill>
+                      <a:schemeClr val="bg1"/>
+                    </a:solidFill>
+                  </a:ln>
+                  <a:gradFill>
+                    <a:gsLst>
+                      <a:gs pos="50000">
+                        <a:srgbClr val="E4D3F1"/>
+                      </a:gs>
+                      <a:gs pos="26000">
+                        <a:srgbClr val="CB4DCE"/>
+                      </a:gs>
+                      <a:gs pos="74000">
+                        <a:srgbClr val="CB4DCE"/>
+                      </a:gs>
+                    </a:gsLst>
+                    <a:lin ang="5400000" scaled="1"/>
+                  </a:gradFill>
+                  <a:effectLst>
+                    <a:outerShdw dist="63500" dir="2700000" algn="tl" rotWithShape="0">
+                      <a:prstClr val="black">
+                        <a:alpha val="40000"/>
+                      </a:prstClr>
+                    </a:outerShdw>
+                  </a:effectLst>
+                  <a:latin typeface="Arial Black" panose="020B0A04020102020204" pitchFamily="34" charset="0"/>
+                </a:endParaRPr>
+              </a:p>
+            </p:txBody>
+          </p:sp>
+          <p:sp>
+            <p:nvSpPr>
+              <p:cNvPr id="7" name="TextBox 6"/>
+              <p:cNvSpPr txBox="1"/>
+              <p:nvPr/>
+            </p:nvSpPr>
+            <p:spPr>
+              <a:xfrm rot="21420000">
+                <a:off x="3833297" y="2028979"/>
+                <a:ext cx="889988" cy="1200329"/>
+              </a:xfrm>
+              <a:prstGeom prst="rect">
+                <a:avLst/>
+              </a:prstGeom>
+              <a:noFill/>
+            </p:spPr>
+            <p:txBody>
+              <a:bodyPr wrap="none" rtlCol="0">
+                <a:spAutoFit/>
+              </a:bodyPr>
+              <a:lstStyle/>
+              <a:p>
+                <a:pPr algn="ctr"/>
+                <a:r>
+                  <a:rPr lang="en-US" altLang="ko-KR" sz="7200" spc="-100" dirty="0">
+                    <a:ln w="38100">
+                      <a:solidFill>
+                        <a:schemeClr val="bg1"/>
+                      </a:solidFill>
+                    </a:ln>
+                    <a:gradFill>
+                      <a:gsLst>
+                        <a:gs pos="50000">
+                          <a:srgbClr val="E4D3F1"/>
+                        </a:gs>
+                        <a:gs pos="26000">
+                          <a:srgbClr val="CB4DCE"/>
+                        </a:gs>
+                        <a:gs pos="74000">
+                          <a:srgbClr val="CB4DCE"/>
+                        </a:gs>
+                      </a:gsLst>
+                      <a:lin ang="5400000" scaled="1"/>
+                    </a:gradFill>
+                    <a:effectLst>
+                      <a:outerShdw dist="63500" dir="2700000" algn="tl" rotWithShape="0">
+                        <a:prstClr val="black">
+                          <a:alpha val="40000"/>
+                        </a:prstClr>
+                      </a:outerShdw>
+                    </a:effectLst>
+                    <a:latin typeface="Arial Black" panose="020B0A04020102020204" pitchFamily="34" charset="0"/>
+                  </a:rPr>
+                  <a:t>R</a:t>
+                </a:r>
+                <a:endParaRPr lang="ko-KR" altLang="en-US" sz="7200" spc="-100" dirty="0">
+                  <a:ln w="38100">
+                    <a:solidFill>
+                      <a:schemeClr val="bg1"/>
+                    </a:solidFill>
+                  </a:ln>
+                  <a:gradFill>
+                    <a:gsLst>
+                      <a:gs pos="50000">
+                        <a:srgbClr val="E4D3F1"/>
+                      </a:gs>
+                      <a:gs pos="26000">
+                        <a:srgbClr val="CB4DCE"/>
+                      </a:gs>
+                      <a:gs pos="74000">
+                        <a:srgbClr val="CB4DCE"/>
+                      </a:gs>
+                    </a:gsLst>
+                    <a:lin ang="5400000" scaled="1"/>
+                  </a:gradFill>
+                  <a:effectLst>
+                    <a:outerShdw dist="63500" dir="2700000" algn="tl" rotWithShape="0">
+                      <a:prstClr val="black">
+                        <a:alpha val="40000"/>
+                      </a:prstClr>
+                    </a:outerShdw>
+                  </a:effectLst>
+                  <a:latin typeface="Arial Black" panose="020B0A04020102020204" pitchFamily="34" charset="0"/>
+                </a:endParaRPr>
+              </a:p>
+            </p:txBody>
+          </p:sp>
+          <p:sp>
+            <p:nvSpPr>
+              <p:cNvPr id="8" name="TextBox 7"/>
+              <p:cNvSpPr txBox="1"/>
+              <p:nvPr/>
+            </p:nvSpPr>
+            <p:spPr>
+              <a:xfrm>
+                <a:off x="4505886" y="2006512"/>
+                <a:ext cx="787396" cy="1200329"/>
+              </a:xfrm>
+              <a:prstGeom prst="rect">
+                <a:avLst/>
+              </a:prstGeom>
+              <a:noFill/>
+            </p:spPr>
+            <p:txBody>
+              <a:bodyPr wrap="none" rtlCol="0">
+                <a:spAutoFit/>
+              </a:bodyPr>
+              <a:lstStyle/>
+              <a:p>
+                <a:pPr algn="ctr"/>
+                <a:r>
+                  <a:rPr lang="en-US" altLang="ko-KR" sz="7200" spc="-100" dirty="0" smtClean="0">
+                    <a:ln w="38100">
+                      <a:solidFill>
+                        <a:schemeClr val="bg1"/>
+                      </a:solidFill>
+                    </a:ln>
+                    <a:gradFill>
+                      <a:gsLst>
+                        <a:gs pos="50000">
+                          <a:srgbClr val="E4D3F1"/>
+                        </a:gs>
+                        <a:gs pos="26000">
+                          <a:srgbClr val="CB4DCE"/>
+                        </a:gs>
+                        <a:gs pos="74000">
+                          <a:srgbClr val="CB4DCE"/>
+                        </a:gs>
+                      </a:gsLst>
+                      <a:lin ang="5400000" scaled="1"/>
+                    </a:gradFill>
+                    <a:effectLst>
+                      <a:outerShdw dist="63500" dir="2700000" algn="tl" rotWithShape="0">
+                        <a:prstClr val="black">
+                          <a:alpha val="40000"/>
+                        </a:prstClr>
+                      </a:outerShdw>
+                    </a:effectLst>
+                    <a:latin typeface="Arial Black" panose="020B0A04020102020204" pitchFamily="34" charset="0"/>
+                  </a:rPr>
+                  <a:t>F</a:t>
+                </a:r>
+                <a:endParaRPr lang="ko-KR" altLang="en-US" sz="7200" spc="-100" dirty="0">
+                  <a:ln w="38100">
+                    <a:solidFill>
+                      <a:schemeClr val="bg1"/>
+                    </a:solidFill>
+                  </a:ln>
+                  <a:gradFill>
+                    <a:gsLst>
+                      <a:gs pos="50000">
+                        <a:srgbClr val="E4D3F1"/>
+                      </a:gs>
+                      <a:gs pos="26000">
+                        <a:srgbClr val="CB4DCE"/>
+                      </a:gs>
+                      <a:gs pos="74000">
+                        <a:srgbClr val="CB4DCE"/>
+                      </a:gs>
+                    </a:gsLst>
+                    <a:lin ang="5400000" scaled="1"/>
+                  </a:gradFill>
+                  <a:effectLst>
+                    <a:outerShdw dist="63500" dir="2700000" algn="tl" rotWithShape="0">
+                      <a:prstClr val="black">
+                        <a:alpha val="40000"/>
+                      </a:prstClr>
+                    </a:outerShdw>
+                  </a:effectLst>
+                  <a:latin typeface="Arial Black" panose="020B0A04020102020204" pitchFamily="34" charset="0"/>
+                </a:endParaRPr>
+              </a:p>
+            </p:txBody>
+          </p:sp>
+          <p:sp>
+            <p:nvSpPr>
+              <p:cNvPr id="9" name="TextBox 8"/>
+              <p:cNvSpPr txBox="1"/>
+              <p:nvPr/>
+            </p:nvSpPr>
+            <p:spPr>
+              <a:xfrm rot="180000">
+                <a:off x="5036487" y="2028978"/>
+                <a:ext cx="838691" cy="1200329"/>
+              </a:xfrm>
+              <a:prstGeom prst="rect">
+                <a:avLst/>
+              </a:prstGeom>
+              <a:noFill/>
+            </p:spPr>
+            <p:txBody>
+              <a:bodyPr wrap="square" rtlCol="0">
+                <a:spAutoFit/>
+              </a:bodyPr>
+              <a:lstStyle/>
+              <a:p>
+                <a:pPr algn="ctr"/>
+                <a:r>
+                  <a:rPr lang="en-US" altLang="ko-KR" sz="7200" spc="-100" dirty="0" smtClean="0">
+                    <a:ln w="38100">
+                      <a:solidFill>
+                        <a:schemeClr val="bg1"/>
+                      </a:solidFill>
+                    </a:ln>
+                    <a:gradFill>
+                      <a:gsLst>
+                        <a:gs pos="50000">
+                          <a:srgbClr val="E4D3F1"/>
+                        </a:gs>
+                        <a:gs pos="26000">
+                          <a:srgbClr val="CB4DCE"/>
+                        </a:gs>
+                        <a:gs pos="74000">
+                          <a:srgbClr val="CB4DCE"/>
+                        </a:gs>
+                      </a:gsLst>
+                      <a:lin ang="5400000" scaled="1"/>
+                    </a:gradFill>
+                    <a:effectLst>
+                      <a:outerShdw dist="63500" dir="2700000" algn="tl" rotWithShape="0">
+                        <a:prstClr val="black">
+                          <a:alpha val="40000"/>
+                        </a:prstClr>
+                      </a:outerShdw>
+                    </a:effectLst>
+                    <a:latin typeface="Arial Black" panose="020B0A04020102020204" pitchFamily="34" charset="0"/>
+                  </a:rPr>
+                  <a:t>E</a:t>
+                </a:r>
+                <a:endParaRPr lang="ko-KR" altLang="en-US" sz="7200" spc="-100" dirty="0">
+                  <a:ln w="38100">
+                    <a:solidFill>
+                      <a:schemeClr val="bg1"/>
+                    </a:solidFill>
+                  </a:ln>
+                  <a:gradFill>
+                    <a:gsLst>
+                      <a:gs pos="50000">
+                        <a:srgbClr val="E4D3F1"/>
+                      </a:gs>
+                      <a:gs pos="26000">
+                        <a:srgbClr val="CB4DCE"/>
+                      </a:gs>
+                      <a:gs pos="74000">
+                        <a:srgbClr val="CB4DCE"/>
+                      </a:gs>
+                    </a:gsLst>
+                    <a:lin ang="5400000" scaled="1"/>
+                  </a:gradFill>
+                  <a:effectLst>
+                    <a:outerShdw dist="63500" dir="2700000" algn="tl" rotWithShape="0">
+                      <a:prstClr val="black">
+                        <a:alpha val="40000"/>
+                      </a:prstClr>
+                    </a:outerShdw>
+                  </a:effectLst>
+                  <a:latin typeface="Arial Black" panose="020B0A04020102020204" pitchFamily="34" charset="0"/>
+                </a:endParaRPr>
+              </a:p>
+            </p:txBody>
+          </p:sp>
+          <p:sp>
+            <p:nvSpPr>
+              <p:cNvPr id="10" name="TextBox 9"/>
+              <p:cNvSpPr txBox="1"/>
+              <p:nvPr/>
+            </p:nvSpPr>
+            <p:spPr>
+              <a:xfrm rot="360000">
+                <a:off x="5641819" y="2094135"/>
+                <a:ext cx="838691" cy="1200329"/>
+              </a:xfrm>
+              <a:prstGeom prst="rect">
+                <a:avLst/>
+              </a:prstGeom>
+              <a:noFill/>
+            </p:spPr>
+            <p:txBody>
+              <a:bodyPr wrap="square" rtlCol="0">
+                <a:spAutoFit/>
+              </a:bodyPr>
+              <a:lstStyle/>
+              <a:p>
+                <a:pPr algn="ctr"/>
+                <a:r>
+                  <a:rPr lang="en-US" altLang="ko-KR" sz="7200" spc="-100" dirty="0">
+                    <a:ln w="38100">
+                      <a:solidFill>
+                        <a:schemeClr val="bg1"/>
+                      </a:solidFill>
+                    </a:ln>
+                    <a:gradFill>
+                      <a:gsLst>
+                        <a:gs pos="50000">
+                          <a:srgbClr val="E4D3F1"/>
+                        </a:gs>
+                        <a:gs pos="26000">
+                          <a:srgbClr val="CB4DCE"/>
+                        </a:gs>
+                        <a:gs pos="74000">
+                          <a:srgbClr val="CB4DCE"/>
+                        </a:gs>
+                      </a:gsLst>
+                      <a:lin ang="5400000" scaled="1"/>
+                    </a:gradFill>
+                    <a:effectLst>
+                      <a:outerShdw dist="63500" dir="2700000" algn="tl" rotWithShape="0">
+                        <a:prstClr val="black">
+                          <a:alpha val="40000"/>
+                        </a:prstClr>
+                      </a:outerShdw>
+                    </a:effectLst>
+                    <a:latin typeface="Arial Black" panose="020B0A04020102020204" pitchFamily="34" charset="0"/>
+                  </a:rPr>
+                  <a:t>C</a:t>
+                </a:r>
+                <a:endParaRPr lang="ko-KR" altLang="en-US" sz="7200" spc="-100" dirty="0">
+                  <a:ln w="38100">
+                    <a:solidFill>
+                      <a:schemeClr val="bg1"/>
+                    </a:solidFill>
+                  </a:ln>
+                  <a:gradFill>
+                    <a:gsLst>
+                      <a:gs pos="50000">
+                        <a:srgbClr val="E4D3F1"/>
+                      </a:gs>
+                      <a:gs pos="26000">
+                        <a:srgbClr val="CB4DCE"/>
+                      </a:gs>
+                      <a:gs pos="74000">
+                        <a:srgbClr val="CB4DCE"/>
+                      </a:gs>
+                    </a:gsLst>
+                    <a:lin ang="5400000" scaled="1"/>
+                  </a:gradFill>
+                  <a:effectLst>
+                    <a:outerShdw dist="63500" dir="2700000" algn="tl" rotWithShape="0">
+                      <a:prstClr val="black">
+                        <a:alpha val="40000"/>
+                      </a:prstClr>
+                    </a:outerShdw>
+                  </a:effectLst>
+                  <a:latin typeface="Arial Black" panose="020B0A04020102020204" pitchFamily="34" charset="0"/>
+                </a:endParaRPr>
+              </a:p>
+            </p:txBody>
+          </p:sp>
+          <p:sp>
+            <p:nvSpPr>
+              <p:cNvPr id="11" name="TextBox 10"/>
+              <p:cNvSpPr txBox="1"/>
+              <p:nvPr/>
+            </p:nvSpPr>
+            <p:spPr>
+              <a:xfrm rot="600000">
+                <a:off x="6255427" y="2190003"/>
+                <a:ext cx="838691" cy="1200329"/>
+              </a:xfrm>
+              <a:prstGeom prst="rect">
+                <a:avLst/>
+              </a:prstGeom>
+              <a:noFill/>
+            </p:spPr>
+            <p:txBody>
+              <a:bodyPr wrap="square" rtlCol="0">
+                <a:spAutoFit/>
+              </a:bodyPr>
+              <a:lstStyle/>
+              <a:p>
+                <a:pPr algn="ctr"/>
+                <a:r>
+                  <a:rPr lang="en-US" altLang="ko-KR" sz="7200" spc="-100" dirty="0" smtClean="0">
+                    <a:ln w="38100">
+                      <a:solidFill>
+                        <a:schemeClr val="bg1"/>
+                      </a:solidFill>
+                    </a:ln>
+                    <a:gradFill>
+                      <a:gsLst>
+                        <a:gs pos="50000">
+                          <a:srgbClr val="E4D3F1"/>
+                        </a:gs>
+                        <a:gs pos="26000">
+                          <a:srgbClr val="CB4DCE"/>
+                        </a:gs>
+                        <a:gs pos="74000">
+                          <a:srgbClr val="CB4DCE"/>
+                        </a:gs>
+                      </a:gsLst>
+                      <a:lin ang="5400000" scaled="1"/>
+                    </a:gradFill>
+                    <a:effectLst>
+                      <a:outerShdw dist="63500" dir="2700000" algn="tl" rotWithShape="0">
+                        <a:prstClr val="black">
+                          <a:alpha val="40000"/>
+                        </a:prstClr>
+                      </a:outerShdw>
+                    </a:effectLst>
+                    <a:latin typeface="Arial Black" panose="020B0A04020102020204" pitchFamily="34" charset="0"/>
+                  </a:rPr>
+                  <a:t>T</a:t>
+                </a:r>
+                <a:endParaRPr lang="ko-KR" altLang="en-US" sz="7200" spc="-100" dirty="0">
+                  <a:ln w="38100">
+                    <a:solidFill>
+                      <a:schemeClr val="bg1"/>
+                    </a:solidFill>
+                  </a:ln>
+                  <a:gradFill>
+                    <a:gsLst>
+                      <a:gs pos="50000">
+                        <a:srgbClr val="E4D3F1"/>
+                      </a:gs>
+                      <a:gs pos="26000">
+                        <a:srgbClr val="CB4DCE"/>
+                      </a:gs>
+                      <a:gs pos="74000">
+                        <a:srgbClr val="CB4DCE"/>
+                      </a:gs>
+                    </a:gsLst>
+                    <a:lin ang="5400000" scaled="1"/>
+                  </a:gradFill>
+                  <a:effectLst>
+                    <a:outerShdw dist="63500" dir="2700000" algn="tl" rotWithShape="0">
+                      <a:prstClr val="black">
+                        <a:alpha val="40000"/>
+                      </a:prstClr>
+                    </a:outerShdw>
+                  </a:effectLst>
+                  <a:latin typeface="Arial Black" panose="020B0A04020102020204" pitchFamily="34" charset="0"/>
+                </a:endParaRPr>
+              </a:p>
+            </p:txBody>
+          </p:sp>
+        </p:grpSp>
+        <p:sp>
+          <p:nvSpPr>
+            <p:cNvPr id="13" name="포인트가 5개인 별 12"/>
+            <p:cNvSpPr/>
+            <p:nvPr/>
+          </p:nvSpPr>
+          <p:spPr>
+            <a:xfrm>
+              <a:off x="6652267" y="2008513"/>
+              <a:ext cx="317036" cy="299799"/>
+            </a:xfrm>
+            <a:prstGeom prst="star5">
+              <a:avLst>
+                <a:gd name="adj" fmla="val 30328"/>
+                <a:gd name="hf" fmla="val 105146"/>
+                <a:gd name="vf" fmla="val 110557"/>
+              </a:avLst>
+            </a:prstGeom>
+            <a:gradFill flip="none" rotWithShape="1">
+              <a:gsLst>
+                <a:gs pos="41000">
+                  <a:srgbClr val="E4D3F1"/>
+                </a:gs>
+                <a:gs pos="8000">
+                  <a:srgbClr val="CB4DCE"/>
+                </a:gs>
+                <a:gs pos="69000">
+                  <a:srgbClr val="CB4DCE"/>
+                </a:gs>
+              </a:gsLst>
+              <a:lin ang="2700000" scaled="1"/>
+              <a:tileRect/>
+            </a:gradFill>
+            <a:ln w="38100" cap="rnd">
+              <a:solidFill>
+                <a:schemeClr val="bg1"/>
+              </a:solidFill>
+              <a:round/>
+            </a:ln>
+          </p:spPr>
+          <p:style>
+            <a:lnRef idx="2">
+              <a:schemeClr val="accent1">
+                <a:shade val="50000"/>
+              </a:schemeClr>
+            </a:lnRef>
+            <a:fillRef idx="1">
+              <a:schemeClr val="accent1"/>
+            </a:fillRef>
+            <a:effectRef idx="0">
+              <a:schemeClr val="accent1"/>
+            </a:effectRef>
+            <a:fontRef idx="minor">
+              <a:schemeClr val="lt1"/>
+            </a:fontRef>
+          </p:style>
+          <p:txBody>
+            <a:bodyPr rtlCol="0" anchor="ctr"/>
+            <a:lstStyle/>
+            <a:p>
+              <a:pPr algn="ctr"/>
+              <a:endParaRPr lang="ko-KR" altLang="en-US"/>
+            </a:p>
+          </p:txBody>
+        </p:sp>
+        <p:sp>
+          <p:nvSpPr>
+            <p:cNvPr id="14" name="포인트가 5개인 별 13"/>
+            <p:cNvSpPr/>
+            <p:nvPr/>
+          </p:nvSpPr>
+          <p:spPr>
+            <a:xfrm>
+              <a:off x="7028756" y="2027534"/>
+              <a:ext cx="376489" cy="362233"/>
+            </a:xfrm>
+            <a:prstGeom prst="star5">
+              <a:avLst>
+                <a:gd name="adj" fmla="val 30328"/>
+                <a:gd name="hf" fmla="val 105146"/>
+                <a:gd name="vf" fmla="val 110557"/>
+              </a:avLst>
+            </a:prstGeom>
+            <a:gradFill flip="none" rotWithShape="1">
+              <a:gsLst>
+                <a:gs pos="41000">
+                  <a:srgbClr val="E4D3F1"/>
+                </a:gs>
+                <a:gs pos="8000">
+                  <a:srgbClr val="CB4DCE"/>
+                </a:gs>
+                <a:gs pos="69000">
+                  <a:srgbClr val="CB4DCE"/>
+                </a:gs>
+              </a:gsLst>
+              <a:lin ang="2700000" scaled="1"/>
+              <a:tileRect/>
+            </a:gradFill>
+            <a:ln w="38100" cap="rnd">
+              <a:solidFill>
+                <a:schemeClr val="bg1"/>
+              </a:solidFill>
+              <a:round/>
+            </a:ln>
+          </p:spPr>
+          <p:style>
+            <a:lnRef idx="2">
+              <a:schemeClr val="accent1">
+                <a:shade val="50000"/>
+              </a:schemeClr>
+            </a:lnRef>
+            <a:fillRef idx="1">
+              <a:schemeClr val="accent1"/>
+            </a:fillRef>
+            <a:effectRef idx="0">
+              <a:schemeClr val="accent1"/>
+            </a:effectRef>
+            <a:fontRef idx="minor">
+              <a:schemeClr val="lt1"/>
+            </a:fontRef>
+          </p:style>
+          <p:txBody>
+            <a:bodyPr rtlCol="0" anchor="ctr"/>
+            <a:lstStyle/>
+            <a:p>
+              <a:pPr algn="ctr"/>
+              <a:endParaRPr lang="ko-KR" altLang="en-US"/>
+            </a:p>
+          </p:txBody>
+        </p:sp>
+        <p:sp>
+          <p:nvSpPr>
+            <p:cNvPr id="15" name="포인트가 5개인 별 14"/>
+            <p:cNvSpPr/>
+            <p:nvPr/>
+          </p:nvSpPr>
+          <p:spPr>
+            <a:xfrm>
+              <a:off x="7167948" y="2462480"/>
+              <a:ext cx="313149" cy="286497"/>
+            </a:xfrm>
+            <a:prstGeom prst="star5">
+              <a:avLst>
+                <a:gd name="adj" fmla="val 30328"/>
+                <a:gd name="hf" fmla="val 105146"/>
+                <a:gd name="vf" fmla="val 110557"/>
+              </a:avLst>
+            </a:prstGeom>
+            <a:gradFill flip="none" rotWithShape="1">
+              <a:gsLst>
+                <a:gs pos="41000">
+                  <a:srgbClr val="E4D3F1"/>
+                </a:gs>
+                <a:gs pos="8000">
+                  <a:srgbClr val="CB4DCE"/>
+                </a:gs>
+                <a:gs pos="69000">
+                  <a:srgbClr val="CB4DCE"/>
+                </a:gs>
+              </a:gsLst>
+              <a:lin ang="2700000" scaled="1"/>
+              <a:tileRect/>
+            </a:gradFill>
+            <a:ln w="38100" cap="rnd">
+              <a:solidFill>
+                <a:schemeClr val="bg1"/>
+              </a:solidFill>
+              <a:round/>
+            </a:ln>
+          </p:spPr>
+          <p:style>
+            <a:lnRef idx="2">
+              <a:schemeClr val="accent1">
+                <a:shade val="50000"/>
+              </a:schemeClr>
+            </a:lnRef>
+            <a:fillRef idx="1">
+              <a:schemeClr val="accent1"/>
+            </a:fillRef>
+            <a:effectRef idx="0">
+              <a:schemeClr val="accent1"/>
+            </a:effectRef>
+            <a:fontRef idx="minor">
+              <a:schemeClr val="lt1"/>
+            </a:fontRef>
+          </p:style>
+          <p:txBody>
+            <a:bodyPr rtlCol="0" anchor="ctr"/>
+            <a:lstStyle/>
+            <a:p>
+              <a:pPr algn="ctr"/>
+              <a:endParaRPr lang="ko-KR" altLang="en-US"/>
+            </a:p>
+          </p:txBody>
+        </p:sp>
+      </p:grpSp>
+    </p:spTree>
+    <p:extLst>
+      <p:ext uri="{BB962C8B-B14F-4D97-AF65-F5344CB8AC3E}">
+        <p14:creationId xmlns:p14="http://schemas.microsoft.com/office/powerpoint/2010/main" val="392112659"/>
+      </p:ext>
+    </p:extLst>
+  </p:cSld>
+  <p:clrMapOvr>
+    <a:masterClrMapping/>
+  </p:clrMapOvr>
+</p:sld>
+</file>
+
 <file path=ppt/theme/theme1.xml><?xml version="1.0" encoding="utf-8"?>
 <a:theme xmlns:a="http://schemas.openxmlformats.org/drawingml/2006/main" name="Office 테마">
   <a:themeElements>

</xml_diff>